<commit_message>
add hanyang univ lecture
</commit_message>
<xml_diff>
--- a/assets/2019-07-31-kros-ss-2019/zero-padding.pptx
+++ b/assets/2019-07-31-kros-ss-2019/zero-padding.pptx
@@ -7,6 +7,13 @@
   <p:sldIdLst>
     <p:sldId id="256" r:id="rId2"/>
     <p:sldId id="257" r:id="rId3"/>
+    <p:sldId id="258" r:id="rId4"/>
+    <p:sldId id="259" r:id="rId5"/>
+    <p:sldId id="260" r:id="rId6"/>
+    <p:sldId id="261" r:id="rId7"/>
+    <p:sldId id="262" r:id="rId8"/>
+    <p:sldId id="263" r:id="rId9"/>
+    <p:sldId id="264" r:id="rId10"/>
   </p:sldIdLst>
   <p:sldSz cx="12192000" cy="6858000"/>
   <p:notesSz cx="6858000" cy="9144000"/>
@@ -105,6 +112,11 @@
       </a:defRPr>
     </a:lvl9pPr>
   </p:defaultTextStyle>
+  <p:extLst>
+    <p:ext uri="{EFAFB233-063F-42B5-8137-9DF3F51BA10A}">
+      <p15:sldGuideLst xmlns:p15="http://schemas.microsoft.com/office/powerpoint/2012/main"/>
+    </p:ext>
+  </p:extLst>
 </p:presentation>
 </file>
 
@@ -239,7 +251,7 @@
           <a:p>
             <a:fld id="{2DBBE0B3-CB24-4B9C-9401-E94395379B92}" type="datetimeFigureOut">
               <a:rPr lang="ko-KR" altLang="en-US" smtClean="0"/>
-              <a:t>2019-08-05</a:t>
+              <a:t>2020-01-13</a:t>
             </a:fld>
             <a:endParaRPr lang="ko-KR" altLang="en-US"/>
           </a:p>
@@ -409,7 +421,7 @@
           <a:p>
             <a:fld id="{2DBBE0B3-CB24-4B9C-9401-E94395379B92}" type="datetimeFigureOut">
               <a:rPr lang="ko-KR" altLang="en-US" smtClean="0"/>
-              <a:t>2019-08-05</a:t>
+              <a:t>2020-01-13</a:t>
             </a:fld>
             <a:endParaRPr lang="ko-KR" altLang="en-US"/>
           </a:p>
@@ -589,7 +601,7 @@
           <a:p>
             <a:fld id="{2DBBE0B3-CB24-4B9C-9401-E94395379B92}" type="datetimeFigureOut">
               <a:rPr lang="ko-KR" altLang="en-US" smtClean="0"/>
-              <a:t>2019-08-05</a:t>
+              <a:t>2020-01-13</a:t>
             </a:fld>
             <a:endParaRPr lang="ko-KR" altLang="en-US"/>
           </a:p>
@@ -759,7 +771,7 @@
           <a:p>
             <a:fld id="{2DBBE0B3-CB24-4B9C-9401-E94395379B92}" type="datetimeFigureOut">
               <a:rPr lang="ko-KR" altLang="en-US" smtClean="0"/>
-              <a:t>2019-08-05</a:t>
+              <a:t>2020-01-13</a:t>
             </a:fld>
             <a:endParaRPr lang="ko-KR" altLang="en-US"/>
           </a:p>
@@ -1005,7 +1017,7 @@
           <a:p>
             <a:fld id="{2DBBE0B3-CB24-4B9C-9401-E94395379B92}" type="datetimeFigureOut">
               <a:rPr lang="ko-KR" altLang="en-US" smtClean="0"/>
-              <a:t>2019-08-05</a:t>
+              <a:t>2020-01-13</a:t>
             </a:fld>
             <a:endParaRPr lang="ko-KR" altLang="en-US"/>
           </a:p>
@@ -1237,7 +1249,7 @@
           <a:p>
             <a:fld id="{2DBBE0B3-CB24-4B9C-9401-E94395379B92}" type="datetimeFigureOut">
               <a:rPr lang="ko-KR" altLang="en-US" smtClean="0"/>
-              <a:t>2019-08-05</a:t>
+              <a:t>2020-01-13</a:t>
             </a:fld>
             <a:endParaRPr lang="ko-KR" altLang="en-US"/>
           </a:p>
@@ -1604,7 +1616,7 @@
           <a:p>
             <a:fld id="{2DBBE0B3-CB24-4B9C-9401-E94395379B92}" type="datetimeFigureOut">
               <a:rPr lang="ko-KR" altLang="en-US" smtClean="0"/>
-              <a:t>2019-08-05</a:t>
+              <a:t>2020-01-13</a:t>
             </a:fld>
             <a:endParaRPr lang="ko-KR" altLang="en-US"/>
           </a:p>
@@ -1722,7 +1734,7 @@
           <a:p>
             <a:fld id="{2DBBE0B3-CB24-4B9C-9401-E94395379B92}" type="datetimeFigureOut">
               <a:rPr lang="ko-KR" altLang="en-US" smtClean="0"/>
-              <a:t>2019-08-05</a:t>
+              <a:t>2020-01-13</a:t>
             </a:fld>
             <a:endParaRPr lang="ko-KR" altLang="en-US"/>
           </a:p>
@@ -1817,7 +1829,7 @@
           <a:p>
             <a:fld id="{2DBBE0B3-CB24-4B9C-9401-E94395379B92}" type="datetimeFigureOut">
               <a:rPr lang="ko-KR" altLang="en-US" smtClean="0"/>
-              <a:t>2019-08-05</a:t>
+              <a:t>2020-01-13</a:t>
             </a:fld>
             <a:endParaRPr lang="ko-KR" altLang="en-US"/>
           </a:p>
@@ -2094,7 +2106,7 @@
           <a:p>
             <a:fld id="{2DBBE0B3-CB24-4B9C-9401-E94395379B92}" type="datetimeFigureOut">
               <a:rPr lang="ko-KR" altLang="en-US" smtClean="0"/>
-              <a:t>2019-08-05</a:t>
+              <a:t>2020-01-13</a:t>
             </a:fld>
             <a:endParaRPr lang="ko-KR" altLang="en-US"/>
           </a:p>
@@ -2347,7 +2359,7 @@
           <a:p>
             <a:fld id="{2DBBE0B3-CB24-4B9C-9401-E94395379B92}" type="datetimeFigureOut">
               <a:rPr lang="ko-KR" altLang="en-US" smtClean="0"/>
-              <a:t>2019-08-05</a:t>
+              <a:t>2020-01-13</a:t>
             </a:fld>
             <a:endParaRPr lang="ko-KR" altLang="en-US"/>
           </a:p>
@@ -2560,7 +2572,7 @@
           <a:p>
             <a:fld id="{2DBBE0B3-CB24-4B9C-9401-E94395379B92}" type="datetimeFigureOut">
               <a:rPr lang="ko-KR" altLang="en-US" smtClean="0"/>
-              <a:t>2019-08-05</a:t>
+              <a:t>2020-01-13</a:t>
             </a:fld>
             <a:endParaRPr lang="ko-KR" altLang="en-US"/>
           </a:p>
@@ -3651,6 +3663,2881 @@
 </p:sld>
 </file>
 
+<file path=ppt/slides/slide3.xml><?xml version="1.0" encoding="utf-8"?>
+<p:sld xmlns:a="http://schemas.openxmlformats.org/drawingml/2006/main" xmlns:r="http://schemas.openxmlformats.org/officeDocument/2006/relationships" xmlns:p="http://schemas.openxmlformats.org/presentationml/2006/main">
+  <p:cSld>
+    <p:spTree>
+      <p:nvGrpSpPr>
+        <p:cNvPr id="1" name=""/>
+        <p:cNvGrpSpPr/>
+        <p:nvPr/>
+      </p:nvGrpSpPr>
+      <p:grpSpPr>
+        <a:xfrm>
+          <a:off x="0" y="0"/>
+          <a:ext cx="0" cy="0"/>
+          <a:chOff x="0" y="0"/>
+          <a:chExt cx="0" cy="0"/>
+        </a:xfrm>
+      </p:grpSpPr>
+      <p:pic>
+        <p:nvPicPr>
+          <p:cNvPr id="1026" name="Picture 2" descr="https://rgbd-dataset.cs.washington.edu/imgs/rgbd_scene.png"/>
+          <p:cNvPicPr>
+            <a:picLocks noChangeAspect="1" noChangeArrowheads="1"/>
+          </p:cNvPicPr>
+          <p:nvPr/>
+        </p:nvPicPr>
+        <p:blipFill rotWithShape="1">
+          <a:blip r:embed="rId2">
+            <a:extLst>
+              <a:ext uri="{28A0092B-C50C-407E-A947-70E740481C1C}">
+                <a14:useLocalDpi xmlns:a14="http://schemas.microsoft.com/office/drawing/2010/main" val="0"/>
+              </a:ext>
+            </a:extLst>
+          </a:blip>
+          <a:srcRect l="69113"/>
+          <a:stretch/>
+        </p:blipFill>
+        <p:spPr bwMode="auto">
+          <a:xfrm>
+            <a:off x="7108371" y="2036717"/>
+            <a:ext cx="1919970" cy="1440000"/>
+          </a:xfrm>
+          <a:prstGeom prst="rect">
+            <a:avLst/>
+          </a:prstGeom>
+          <a:noFill/>
+          <a:extLst>
+            <a:ext uri="{909E8E84-426E-40DD-AFC4-6F175D3DCCD1}">
+              <a14:hiddenFill xmlns:a14="http://schemas.microsoft.com/office/drawing/2010/main">
+                <a:solidFill>
+                  <a:srgbClr val="FFFFFF"/>
+                </a:solidFill>
+              </a14:hiddenFill>
+            </a:ext>
+          </a:extLst>
+        </p:spPr>
+      </p:pic>
+      <p:pic>
+        <p:nvPicPr>
+          <p:cNvPr id="4" name="Picture 2" descr="https://rgbd-dataset.cs.washington.edu/imgs/rgbd_scene.png"/>
+          <p:cNvPicPr>
+            <a:picLocks noChangeAspect="1" noChangeArrowheads="1"/>
+          </p:cNvPicPr>
+          <p:nvPr/>
+        </p:nvPicPr>
+        <p:blipFill rotWithShape="1">
+          <a:blip r:embed="rId2">
+            <a:extLst>
+              <a:ext uri="{28A0092B-C50C-407E-A947-70E740481C1C}">
+                <a14:useLocalDpi xmlns:a14="http://schemas.microsoft.com/office/drawing/2010/main" val="0"/>
+              </a:ext>
+            </a:extLst>
+          </a:blip>
+          <a:srcRect r="69254"/>
+          <a:stretch/>
+        </p:blipFill>
+        <p:spPr bwMode="auto">
+          <a:xfrm>
+            <a:off x="1668689" y="2036716"/>
+            <a:ext cx="1911142" cy="1440000"/>
+          </a:xfrm>
+          <a:prstGeom prst="rect">
+            <a:avLst/>
+          </a:prstGeom>
+          <a:noFill/>
+          <a:extLst>
+            <a:ext uri="{909E8E84-426E-40DD-AFC4-6F175D3DCCD1}">
+              <a14:hiddenFill xmlns:a14="http://schemas.microsoft.com/office/drawing/2010/main">
+                <a:solidFill>
+                  <a:srgbClr val="FFFFFF"/>
+                </a:solidFill>
+              </a14:hiddenFill>
+            </a:ext>
+          </a:extLst>
+        </p:spPr>
+      </p:pic>
+      <p:sp>
+        <p:nvSpPr>
+          <p:cNvPr id="5" name="모서리가 둥근 직사각형 4"/>
+          <p:cNvSpPr/>
+          <p:nvPr/>
+        </p:nvSpPr>
+        <p:spPr>
+          <a:xfrm>
+            <a:off x="4441372" y="2032679"/>
+            <a:ext cx="1800000" cy="1440000"/>
+          </a:xfrm>
+          <a:prstGeom prst="roundRect">
+            <a:avLst/>
+          </a:prstGeom>
+          <a:ln w="57150"/>
+        </p:spPr>
+        <p:style>
+          <a:lnRef idx="2">
+            <a:schemeClr val="accent5"/>
+          </a:lnRef>
+          <a:fillRef idx="1">
+            <a:schemeClr val="lt1"/>
+          </a:fillRef>
+          <a:effectRef idx="0">
+            <a:schemeClr val="accent5"/>
+          </a:effectRef>
+          <a:fontRef idx="minor">
+            <a:schemeClr val="dk1"/>
+          </a:fontRef>
+        </p:style>
+        <p:txBody>
+          <a:bodyPr wrap="none" rtlCol="0" anchor="ctr"/>
+          <a:lstStyle/>
+          <a:p>
+            <a:pPr algn="ctr"/>
+            <a:r>
+              <a:rPr lang="en-US" altLang="ko-KR" sz="2400" dirty="0" smtClean="0"/>
+              <a:t>Monocular</a:t>
+            </a:r>
+          </a:p>
+          <a:p>
+            <a:pPr algn="ctr"/>
+            <a:r>
+              <a:rPr lang="en-US" altLang="ko-KR" sz="2400" dirty="0" smtClean="0"/>
+              <a:t>Depth </a:t>
+            </a:r>
+          </a:p>
+          <a:p>
+            <a:pPr algn="ctr"/>
+            <a:r>
+              <a:rPr lang="en-US" altLang="ko-KR" sz="2400" dirty="0" smtClean="0"/>
+              <a:t>Estimation</a:t>
+            </a:r>
+            <a:endParaRPr lang="ko-KR" altLang="en-US" sz="2400" dirty="0"/>
+          </a:p>
+        </p:txBody>
+      </p:sp>
+      <p:sp>
+        <p:nvSpPr>
+          <p:cNvPr id="6" name="오른쪽 화살표 5"/>
+          <p:cNvSpPr/>
+          <p:nvPr/>
+        </p:nvSpPr>
+        <p:spPr>
+          <a:xfrm>
+            <a:off x="3852758" y="2349908"/>
+            <a:ext cx="315686" cy="805542"/>
+          </a:xfrm>
+          <a:prstGeom prst="rightArrow">
+            <a:avLst/>
+          </a:prstGeom>
+          <a:solidFill>
+            <a:schemeClr val="bg1">
+              <a:lumMod val="65000"/>
+            </a:schemeClr>
+          </a:solidFill>
+          <a:ln>
+            <a:noFill/>
+          </a:ln>
+        </p:spPr>
+        <p:style>
+          <a:lnRef idx="2">
+            <a:schemeClr val="accent1">
+              <a:shade val="50000"/>
+            </a:schemeClr>
+          </a:lnRef>
+          <a:fillRef idx="1">
+            <a:schemeClr val="accent1"/>
+          </a:fillRef>
+          <a:effectRef idx="0">
+            <a:schemeClr val="accent1"/>
+          </a:effectRef>
+          <a:fontRef idx="minor">
+            <a:schemeClr val="lt1"/>
+          </a:fontRef>
+        </p:style>
+        <p:txBody>
+          <a:bodyPr rtlCol="0" anchor="ctr"/>
+          <a:lstStyle/>
+          <a:p>
+            <a:pPr algn="ctr"/>
+            <a:endParaRPr lang="ko-KR" altLang="en-US"/>
+          </a:p>
+        </p:txBody>
+      </p:sp>
+      <p:sp>
+        <p:nvSpPr>
+          <p:cNvPr id="8" name="오른쪽 화살표 7"/>
+          <p:cNvSpPr/>
+          <p:nvPr/>
+        </p:nvSpPr>
+        <p:spPr>
+          <a:xfrm>
+            <a:off x="6513907" y="2349908"/>
+            <a:ext cx="315686" cy="805542"/>
+          </a:xfrm>
+          <a:prstGeom prst="rightArrow">
+            <a:avLst/>
+          </a:prstGeom>
+          <a:solidFill>
+            <a:schemeClr val="bg1">
+              <a:lumMod val="65000"/>
+            </a:schemeClr>
+          </a:solidFill>
+          <a:ln>
+            <a:noFill/>
+          </a:ln>
+        </p:spPr>
+        <p:style>
+          <a:lnRef idx="2">
+            <a:schemeClr val="accent1">
+              <a:shade val="50000"/>
+            </a:schemeClr>
+          </a:lnRef>
+          <a:fillRef idx="1">
+            <a:schemeClr val="accent1"/>
+          </a:fillRef>
+          <a:effectRef idx="0">
+            <a:schemeClr val="accent1"/>
+          </a:effectRef>
+          <a:fontRef idx="minor">
+            <a:schemeClr val="lt1"/>
+          </a:fontRef>
+        </p:style>
+        <p:txBody>
+          <a:bodyPr rtlCol="0" anchor="ctr"/>
+          <a:lstStyle/>
+          <a:p>
+            <a:pPr algn="ctr"/>
+            <a:endParaRPr lang="ko-KR" altLang="en-US"/>
+          </a:p>
+        </p:txBody>
+      </p:sp>
+      <p:sp>
+        <p:nvSpPr>
+          <p:cNvPr id="7" name="TextBox 6"/>
+          <p:cNvSpPr txBox="1"/>
+          <p:nvPr/>
+        </p:nvSpPr>
+        <p:spPr>
+          <a:xfrm>
+            <a:off x="1571055" y="1567543"/>
+            <a:ext cx="2106410" cy="369332"/>
+          </a:xfrm>
+          <a:prstGeom prst="rect">
+            <a:avLst/>
+          </a:prstGeom>
+          <a:noFill/>
+        </p:spPr>
+        <p:txBody>
+          <a:bodyPr wrap="none" rtlCol="0">
+            <a:spAutoFit/>
+          </a:bodyPr>
+          <a:lstStyle/>
+          <a:p>
+            <a:pPr algn="ctr"/>
+            <a:r>
+              <a:rPr lang="en-US" altLang="ko-KR" dirty="0" smtClean="0"/>
+              <a:t>RGB image (input)</a:t>
+            </a:r>
+            <a:endParaRPr lang="ko-KR" altLang="en-US" dirty="0"/>
+          </a:p>
+        </p:txBody>
+      </p:sp>
+      <p:sp>
+        <p:nvSpPr>
+          <p:cNvPr id="10" name="TextBox 9"/>
+          <p:cNvSpPr txBox="1"/>
+          <p:nvPr/>
+        </p:nvSpPr>
+        <p:spPr>
+          <a:xfrm>
+            <a:off x="6828751" y="1567543"/>
+            <a:ext cx="2473754" cy="369332"/>
+          </a:xfrm>
+          <a:prstGeom prst="rect">
+            <a:avLst/>
+          </a:prstGeom>
+          <a:noFill/>
+        </p:spPr>
+        <p:txBody>
+          <a:bodyPr wrap="none" rtlCol="0">
+            <a:spAutoFit/>
+          </a:bodyPr>
+          <a:lstStyle/>
+          <a:p>
+            <a:pPr algn="ctr"/>
+            <a:r>
+              <a:rPr lang="en-US" altLang="ko-KR" dirty="0" smtClean="0"/>
+              <a:t>Depth image (output)</a:t>
+            </a:r>
+            <a:endParaRPr lang="ko-KR" altLang="en-US" dirty="0"/>
+          </a:p>
+        </p:txBody>
+      </p:sp>
+    </p:spTree>
+    <p:extLst>
+      <p:ext uri="{BB962C8B-B14F-4D97-AF65-F5344CB8AC3E}">
+        <p14:creationId xmlns:p14="http://schemas.microsoft.com/office/powerpoint/2010/main" val="2033539472"/>
+      </p:ext>
+    </p:extLst>
+  </p:cSld>
+  <p:clrMapOvr>
+    <a:masterClrMapping/>
+  </p:clrMapOvr>
+</p:sld>
+</file>
+
+<file path=ppt/slides/slide4.xml><?xml version="1.0" encoding="utf-8"?>
+<p:sld xmlns:a="http://schemas.openxmlformats.org/drawingml/2006/main" xmlns:r="http://schemas.openxmlformats.org/officeDocument/2006/relationships" xmlns:p="http://schemas.openxmlformats.org/presentationml/2006/main">
+  <p:cSld>
+    <p:spTree>
+      <p:nvGrpSpPr>
+        <p:cNvPr id="1" name=""/>
+        <p:cNvGrpSpPr/>
+        <p:nvPr/>
+      </p:nvGrpSpPr>
+      <p:grpSpPr>
+        <a:xfrm>
+          <a:off x="0" y="0"/>
+          <a:ext cx="0" cy="0"/>
+          <a:chOff x="0" y="0"/>
+          <a:chExt cx="0" cy="0"/>
+        </a:xfrm>
+      </p:grpSpPr>
+      <p:pic>
+        <p:nvPicPr>
+          <p:cNvPr id="2" name="그림 1"/>
+          <p:cNvPicPr>
+            <a:picLocks noChangeAspect="1"/>
+          </p:cNvPicPr>
+          <p:nvPr/>
+        </p:nvPicPr>
+        <p:blipFill>
+          <a:blip r:embed="rId2">
+            <a:extLst>
+              <a:ext uri="{28A0092B-C50C-407E-A947-70E740481C1C}">
+                <a14:useLocalDpi xmlns:a14="http://schemas.microsoft.com/office/drawing/2010/main" val="0"/>
+              </a:ext>
+            </a:extLst>
+          </a:blip>
+          <a:stretch>
+            <a:fillRect/>
+          </a:stretch>
+        </p:blipFill>
+        <p:spPr>
+          <a:xfrm>
+            <a:off x="1554628" y="1881611"/>
+            <a:ext cx="3596343" cy="2395530"/>
+          </a:xfrm>
+          <a:prstGeom prst="rect">
+            <a:avLst/>
+          </a:prstGeom>
+        </p:spPr>
+      </p:pic>
+      <p:pic>
+        <p:nvPicPr>
+          <p:cNvPr id="3" name="그림 2"/>
+          <p:cNvPicPr>
+            <a:picLocks noChangeAspect="1"/>
+          </p:cNvPicPr>
+          <p:nvPr/>
+        </p:nvPicPr>
+        <p:blipFill>
+          <a:blip r:embed="rId3">
+            <a:extLst>
+              <a:ext uri="{28A0092B-C50C-407E-A947-70E740481C1C}">
+                <a14:useLocalDpi xmlns:a14="http://schemas.microsoft.com/office/drawing/2010/main" val="0"/>
+              </a:ext>
+            </a:extLst>
+          </a:blip>
+          <a:stretch>
+            <a:fillRect/>
+          </a:stretch>
+        </p:blipFill>
+        <p:spPr>
+          <a:xfrm>
+            <a:off x="5252569" y="1881611"/>
+            <a:ext cx="3596343" cy="2395530"/>
+          </a:xfrm>
+          <a:prstGeom prst="rect">
+            <a:avLst/>
+          </a:prstGeom>
+        </p:spPr>
+      </p:pic>
+    </p:spTree>
+    <p:extLst>
+      <p:ext uri="{BB962C8B-B14F-4D97-AF65-F5344CB8AC3E}">
+        <p14:creationId xmlns:p14="http://schemas.microsoft.com/office/powerpoint/2010/main" val="2932593170"/>
+      </p:ext>
+    </p:extLst>
+  </p:cSld>
+  <p:clrMapOvr>
+    <a:masterClrMapping/>
+  </p:clrMapOvr>
+</p:sld>
+</file>
+
+<file path=ppt/slides/slide5.xml><?xml version="1.0" encoding="utf-8"?>
+<p:sld xmlns:a="http://schemas.openxmlformats.org/drawingml/2006/main" xmlns:r="http://schemas.openxmlformats.org/officeDocument/2006/relationships" xmlns:p="http://schemas.openxmlformats.org/presentationml/2006/main">
+  <p:cSld>
+    <p:spTree>
+      <p:nvGrpSpPr>
+        <p:cNvPr id="1" name=""/>
+        <p:cNvGrpSpPr/>
+        <p:nvPr/>
+      </p:nvGrpSpPr>
+      <p:grpSpPr>
+        <a:xfrm>
+          <a:off x="0" y="0"/>
+          <a:ext cx="0" cy="0"/>
+          <a:chOff x="0" y="0"/>
+          <a:chExt cx="0" cy="0"/>
+        </a:xfrm>
+      </p:grpSpPr>
+      <p:pic>
+        <p:nvPicPr>
+          <p:cNvPr id="5" name="그림 4"/>
+          <p:cNvPicPr>
+            <a:picLocks noChangeAspect="1"/>
+          </p:cNvPicPr>
+          <p:nvPr/>
+        </p:nvPicPr>
+        <p:blipFill rotWithShape="1">
+          <a:blip r:embed="rId2">
+            <a:extLst>
+              <a:ext uri="{28A0092B-C50C-407E-A947-70E740481C1C}">
+                <a14:useLocalDpi xmlns:a14="http://schemas.microsoft.com/office/drawing/2010/main" val="0"/>
+              </a:ext>
+            </a:extLst>
+          </a:blip>
+          <a:srcRect l="8745" t="19688" r="9368" b="21933"/>
+          <a:stretch/>
+        </p:blipFill>
+        <p:spPr>
+          <a:xfrm>
+            <a:off x="3120204" y="1077043"/>
+            <a:ext cx="2274231" cy="1080000"/>
+          </a:xfrm>
+          <a:prstGeom prst="rect">
+            <a:avLst/>
+          </a:prstGeom>
+        </p:spPr>
+      </p:pic>
+      <p:pic>
+        <p:nvPicPr>
+          <p:cNvPr id="2" name="그림 1"/>
+          <p:cNvPicPr>
+            <a:picLocks noChangeAspect="1"/>
+          </p:cNvPicPr>
+          <p:nvPr/>
+        </p:nvPicPr>
+        <p:blipFill rotWithShape="1">
+          <a:blip r:embed="rId3"/>
+          <a:srcRect r="67130"/>
+          <a:stretch/>
+        </p:blipFill>
+        <p:spPr>
+          <a:xfrm>
+            <a:off x="697564" y="2544536"/>
+            <a:ext cx="1929698" cy="1440000"/>
+          </a:xfrm>
+          <a:prstGeom prst="rect">
+            <a:avLst/>
+          </a:prstGeom>
+        </p:spPr>
+      </p:pic>
+      <p:pic>
+        <p:nvPicPr>
+          <p:cNvPr id="8" name="그림 7"/>
+          <p:cNvPicPr>
+            <a:picLocks noChangeAspect="1"/>
+          </p:cNvPicPr>
+          <p:nvPr/>
+        </p:nvPicPr>
+        <p:blipFill rotWithShape="1">
+          <a:blip r:embed="rId3"/>
+          <a:srcRect l="33588" r="33707"/>
+          <a:stretch/>
+        </p:blipFill>
+        <p:spPr>
+          <a:xfrm>
+            <a:off x="8022771" y="2544536"/>
+            <a:ext cx="1920000" cy="1440000"/>
+          </a:xfrm>
+          <a:prstGeom prst="rect">
+            <a:avLst/>
+          </a:prstGeom>
+        </p:spPr>
+      </p:pic>
+      <p:pic>
+        <p:nvPicPr>
+          <p:cNvPr id="9" name="그림 8"/>
+          <p:cNvPicPr>
+            <a:picLocks noChangeAspect="1"/>
+          </p:cNvPicPr>
+          <p:nvPr/>
+        </p:nvPicPr>
+        <p:blipFill rotWithShape="1">
+          <a:blip r:embed="rId3"/>
+          <a:srcRect l="67192"/>
+          <a:stretch/>
+        </p:blipFill>
+        <p:spPr>
+          <a:xfrm>
+            <a:off x="5495866" y="2544536"/>
+            <a:ext cx="1926124" cy="1440000"/>
+          </a:xfrm>
+          <a:prstGeom prst="rect">
+            <a:avLst/>
+          </a:prstGeom>
+        </p:spPr>
+      </p:pic>
+      <p:sp>
+        <p:nvSpPr>
+          <p:cNvPr id="10" name="모서리가 둥근 직사각형 9"/>
+          <p:cNvSpPr/>
+          <p:nvPr/>
+        </p:nvSpPr>
+        <p:spPr>
+          <a:xfrm>
+            <a:off x="3088692" y="2544536"/>
+            <a:ext cx="1800000" cy="1440000"/>
+          </a:xfrm>
+          <a:prstGeom prst="roundRect">
+            <a:avLst/>
+          </a:prstGeom>
+          <a:ln w="57150"/>
+        </p:spPr>
+        <p:style>
+          <a:lnRef idx="2">
+            <a:schemeClr val="accent5"/>
+          </a:lnRef>
+          <a:fillRef idx="1">
+            <a:schemeClr val="lt1"/>
+          </a:fillRef>
+          <a:effectRef idx="0">
+            <a:schemeClr val="accent5"/>
+          </a:effectRef>
+          <a:fontRef idx="minor">
+            <a:schemeClr val="dk1"/>
+          </a:fontRef>
+        </p:style>
+        <p:txBody>
+          <a:bodyPr wrap="none" rtlCol="0" anchor="ctr"/>
+          <a:lstStyle/>
+          <a:p>
+            <a:pPr algn="ctr"/>
+            <a:r>
+              <a:rPr lang="en-US" altLang="ko-KR" sz="2400" dirty="0" smtClean="0"/>
+              <a:t>Monocular</a:t>
+            </a:r>
+          </a:p>
+          <a:p>
+            <a:pPr algn="ctr"/>
+            <a:r>
+              <a:rPr lang="en-US" altLang="ko-KR" sz="2400" dirty="0" smtClean="0"/>
+              <a:t>Depth </a:t>
+            </a:r>
+          </a:p>
+          <a:p>
+            <a:pPr algn="ctr"/>
+            <a:r>
+              <a:rPr lang="en-US" altLang="ko-KR" sz="2400" dirty="0" smtClean="0"/>
+              <a:t>Estimation</a:t>
+            </a:r>
+            <a:endParaRPr lang="ko-KR" altLang="en-US" sz="2400" dirty="0"/>
+          </a:p>
+        </p:txBody>
+      </p:sp>
+      <p:sp>
+        <p:nvSpPr>
+          <p:cNvPr id="11" name="오른쪽 화살표 10"/>
+          <p:cNvSpPr/>
+          <p:nvPr/>
+        </p:nvSpPr>
+        <p:spPr>
+          <a:xfrm>
+            <a:off x="2700134" y="2907665"/>
+            <a:ext cx="315686" cy="805542"/>
+          </a:xfrm>
+          <a:prstGeom prst="rightArrow">
+            <a:avLst/>
+          </a:prstGeom>
+          <a:solidFill>
+            <a:schemeClr val="bg1">
+              <a:lumMod val="65000"/>
+            </a:schemeClr>
+          </a:solidFill>
+          <a:ln>
+            <a:noFill/>
+          </a:ln>
+        </p:spPr>
+        <p:style>
+          <a:lnRef idx="2">
+            <a:schemeClr val="accent1">
+              <a:shade val="50000"/>
+            </a:schemeClr>
+          </a:lnRef>
+          <a:fillRef idx="1">
+            <a:schemeClr val="accent1"/>
+          </a:fillRef>
+          <a:effectRef idx="0">
+            <a:schemeClr val="accent1"/>
+          </a:effectRef>
+          <a:fontRef idx="minor">
+            <a:schemeClr val="lt1"/>
+          </a:fontRef>
+        </p:style>
+        <p:txBody>
+          <a:bodyPr rtlCol="0" anchor="ctr"/>
+          <a:lstStyle/>
+          <a:p>
+            <a:pPr algn="ctr"/>
+            <a:endParaRPr lang="ko-KR" altLang="en-US"/>
+          </a:p>
+        </p:txBody>
+      </p:sp>
+      <p:sp>
+        <p:nvSpPr>
+          <p:cNvPr id="12" name="오른쪽 화살표 11"/>
+          <p:cNvSpPr/>
+          <p:nvPr/>
+        </p:nvSpPr>
+        <p:spPr>
+          <a:xfrm>
+            <a:off x="5034436" y="2907665"/>
+            <a:ext cx="315686" cy="805542"/>
+          </a:xfrm>
+          <a:prstGeom prst="rightArrow">
+            <a:avLst/>
+          </a:prstGeom>
+          <a:solidFill>
+            <a:schemeClr val="bg1">
+              <a:lumMod val="65000"/>
+            </a:schemeClr>
+          </a:solidFill>
+          <a:ln>
+            <a:noFill/>
+          </a:ln>
+        </p:spPr>
+        <p:style>
+          <a:lnRef idx="2">
+            <a:schemeClr val="accent1">
+              <a:shade val="50000"/>
+            </a:schemeClr>
+          </a:lnRef>
+          <a:fillRef idx="1">
+            <a:schemeClr val="accent1"/>
+          </a:fillRef>
+          <a:effectRef idx="0">
+            <a:schemeClr val="accent1"/>
+          </a:effectRef>
+          <a:fontRef idx="minor">
+            <a:schemeClr val="lt1"/>
+          </a:fontRef>
+        </p:style>
+        <p:txBody>
+          <a:bodyPr rtlCol="0" anchor="ctr"/>
+          <a:lstStyle/>
+          <a:p>
+            <a:pPr algn="ctr"/>
+            <a:endParaRPr lang="ko-KR" altLang="en-US"/>
+          </a:p>
+        </p:txBody>
+      </p:sp>
+      <p:cxnSp>
+        <p:nvCxnSpPr>
+          <p:cNvPr id="7" name="꺾인 연결선 6"/>
+          <p:cNvCxnSpPr>
+            <a:stCxn id="5" idx="1"/>
+            <a:endCxn id="2" idx="0"/>
+          </p:cNvCxnSpPr>
+          <p:nvPr/>
+        </p:nvCxnSpPr>
+        <p:spPr>
+          <a:xfrm rot="10800000" flipV="1">
+            <a:off x="1662414" y="1617042"/>
+            <a:ext cx="1457791" cy="927493"/>
+          </a:xfrm>
+          <a:prstGeom prst="bentConnector2">
+            <a:avLst/>
+          </a:prstGeom>
+          <a:ln>
+            <a:solidFill>
+              <a:schemeClr val="tx1"/>
+            </a:solidFill>
+            <a:tailEnd type="triangle"/>
+          </a:ln>
+        </p:spPr>
+        <p:style>
+          <a:lnRef idx="1">
+            <a:schemeClr val="accent1"/>
+          </a:lnRef>
+          <a:fillRef idx="0">
+            <a:schemeClr val="accent1"/>
+          </a:fillRef>
+          <a:effectRef idx="0">
+            <a:schemeClr val="accent1"/>
+          </a:effectRef>
+          <a:fontRef idx="minor">
+            <a:schemeClr val="tx1"/>
+          </a:fontRef>
+        </p:style>
+      </p:cxnSp>
+      <p:cxnSp>
+        <p:nvCxnSpPr>
+          <p:cNvPr id="14" name="꺾인 연결선 13"/>
+          <p:cNvCxnSpPr>
+            <a:stCxn id="5" idx="3"/>
+            <a:endCxn id="8" idx="0"/>
+          </p:cNvCxnSpPr>
+          <p:nvPr/>
+        </p:nvCxnSpPr>
+        <p:spPr>
+          <a:xfrm>
+            <a:off x="5394435" y="1617043"/>
+            <a:ext cx="3588336" cy="927493"/>
+          </a:xfrm>
+          <a:prstGeom prst="bentConnector2">
+            <a:avLst/>
+          </a:prstGeom>
+          <a:ln>
+            <a:solidFill>
+              <a:schemeClr val="tx1"/>
+            </a:solidFill>
+            <a:tailEnd type="triangle"/>
+          </a:ln>
+        </p:spPr>
+        <p:style>
+          <a:lnRef idx="1">
+            <a:schemeClr val="accent1"/>
+          </a:lnRef>
+          <a:fillRef idx="0">
+            <a:schemeClr val="accent1"/>
+          </a:fillRef>
+          <a:effectRef idx="0">
+            <a:schemeClr val="accent1"/>
+          </a:effectRef>
+          <a:fontRef idx="minor">
+            <a:schemeClr val="tx1"/>
+          </a:fontRef>
+        </p:style>
+      </p:cxnSp>
+      <p:sp>
+        <p:nvSpPr>
+          <p:cNvPr id="15" name="타원 14"/>
+          <p:cNvSpPr/>
+          <p:nvPr/>
+        </p:nvSpPr>
+        <p:spPr>
+          <a:xfrm>
+            <a:off x="7567734" y="3111102"/>
+            <a:ext cx="306867" cy="306867"/>
+          </a:xfrm>
+          <a:prstGeom prst="ellipse">
+            <a:avLst/>
+          </a:prstGeom>
+          <a:ln w="19050"/>
+        </p:spPr>
+        <p:style>
+          <a:lnRef idx="2">
+            <a:schemeClr val="dk1"/>
+          </a:lnRef>
+          <a:fillRef idx="1">
+            <a:schemeClr val="lt1"/>
+          </a:fillRef>
+          <a:effectRef idx="0">
+            <a:schemeClr val="dk1"/>
+          </a:effectRef>
+          <a:fontRef idx="minor">
+            <a:schemeClr val="dk1"/>
+          </a:fontRef>
+        </p:style>
+        <p:txBody>
+          <a:bodyPr rtlCol="0" anchor="ctr"/>
+          <a:lstStyle/>
+          <a:p>
+            <a:pPr algn="ctr"/>
+            <a:r>
+              <a:rPr lang="ko-KR" altLang="en-US" b="1" dirty="0" smtClean="0"/>
+              <a:t>─</a:t>
+            </a:r>
+            <a:endParaRPr lang="ko-KR" altLang="en-US" b="1" dirty="0"/>
+          </a:p>
+        </p:txBody>
+      </p:sp>
+      <p:cxnSp>
+        <p:nvCxnSpPr>
+          <p:cNvPr id="17" name="꺾인 연결선 16"/>
+          <p:cNvCxnSpPr>
+            <a:stCxn id="15" idx="4"/>
+            <a:endCxn id="10" idx="2"/>
+          </p:cNvCxnSpPr>
+          <p:nvPr/>
+        </p:nvCxnSpPr>
+        <p:spPr>
+          <a:xfrm rot="5400000">
+            <a:off x="5571647" y="1835014"/>
+            <a:ext cx="566567" cy="3732476"/>
+          </a:xfrm>
+          <a:prstGeom prst="bentConnector3">
+            <a:avLst>
+              <a:gd name="adj1" fmla="val 192225"/>
+            </a:avLst>
+          </a:prstGeom>
+          <a:ln>
+            <a:solidFill>
+              <a:schemeClr val="tx1"/>
+            </a:solidFill>
+            <a:tailEnd type="triangle"/>
+          </a:ln>
+        </p:spPr>
+        <p:style>
+          <a:lnRef idx="1">
+            <a:schemeClr val="accent1"/>
+          </a:lnRef>
+          <a:fillRef idx="0">
+            <a:schemeClr val="accent1"/>
+          </a:fillRef>
+          <a:effectRef idx="0">
+            <a:schemeClr val="accent1"/>
+          </a:effectRef>
+          <a:fontRef idx="minor">
+            <a:schemeClr val="tx1"/>
+          </a:fontRef>
+        </p:style>
+      </p:cxnSp>
+      <p:sp>
+        <p:nvSpPr>
+          <p:cNvPr id="19" name="TextBox 18"/>
+          <p:cNvSpPr txBox="1"/>
+          <p:nvPr/>
+        </p:nvSpPr>
+        <p:spPr>
+          <a:xfrm>
+            <a:off x="1745311" y="1247710"/>
+            <a:ext cx="1343381" cy="369332"/>
+          </a:xfrm>
+          <a:prstGeom prst="rect">
+            <a:avLst/>
+          </a:prstGeom>
+          <a:noFill/>
+        </p:spPr>
+        <p:txBody>
+          <a:bodyPr wrap="none" rtlCol="0">
+            <a:spAutoFit/>
+          </a:bodyPr>
+          <a:lstStyle/>
+          <a:p>
+            <a:r>
+              <a:rPr lang="en-US" altLang="ko-KR" dirty="0" smtClean="0"/>
+              <a:t>RGB image</a:t>
+            </a:r>
+            <a:endParaRPr lang="ko-KR" altLang="en-US" dirty="0"/>
+          </a:p>
+        </p:txBody>
+      </p:sp>
+      <p:sp>
+        <p:nvSpPr>
+          <p:cNvPr id="22" name="TextBox 21"/>
+          <p:cNvSpPr txBox="1"/>
+          <p:nvPr/>
+        </p:nvSpPr>
+        <p:spPr>
+          <a:xfrm>
+            <a:off x="6262930" y="1243172"/>
+            <a:ext cx="1548822" cy="369332"/>
+          </a:xfrm>
+          <a:prstGeom prst="rect">
+            <a:avLst/>
+          </a:prstGeom>
+          <a:noFill/>
+        </p:spPr>
+        <p:txBody>
+          <a:bodyPr wrap="none" rtlCol="0">
+            <a:spAutoFit/>
+          </a:bodyPr>
+          <a:lstStyle/>
+          <a:p>
+            <a:r>
+              <a:rPr lang="en-US" altLang="ko-KR" dirty="0" smtClean="0"/>
+              <a:t>Depth image</a:t>
+            </a:r>
+            <a:endParaRPr lang="ko-KR" altLang="en-US" dirty="0"/>
+          </a:p>
+        </p:txBody>
+      </p:sp>
+      <p:sp>
+        <p:nvSpPr>
+          <p:cNvPr id="23" name="TextBox 22"/>
+          <p:cNvSpPr txBox="1"/>
+          <p:nvPr/>
+        </p:nvSpPr>
+        <p:spPr>
+          <a:xfrm>
+            <a:off x="5350122" y="4125507"/>
+            <a:ext cx="1006173" cy="369332"/>
+          </a:xfrm>
+          <a:prstGeom prst="rect">
+            <a:avLst/>
+          </a:prstGeom>
+          <a:noFill/>
+        </p:spPr>
+        <p:txBody>
+          <a:bodyPr wrap="none" rtlCol="0">
+            <a:spAutoFit/>
+          </a:bodyPr>
+          <a:lstStyle/>
+          <a:p>
+            <a:r>
+              <a:rPr lang="en-US" altLang="ko-KR" dirty="0" smtClean="0"/>
+              <a:t>Training</a:t>
+            </a:r>
+            <a:endParaRPr lang="ko-KR" altLang="en-US" dirty="0"/>
+          </a:p>
+        </p:txBody>
+      </p:sp>
+      <p:sp>
+        <p:nvSpPr>
+          <p:cNvPr id="25" name="TextBox 24"/>
+          <p:cNvSpPr txBox="1"/>
+          <p:nvPr/>
+        </p:nvSpPr>
+        <p:spPr>
+          <a:xfrm>
+            <a:off x="5480169" y="2169738"/>
+            <a:ext cx="1957524" cy="369332"/>
+          </a:xfrm>
+          <a:prstGeom prst="rect">
+            <a:avLst/>
+          </a:prstGeom>
+          <a:noFill/>
+        </p:spPr>
+        <p:txBody>
+          <a:bodyPr wrap="none" rtlCol="0">
+            <a:spAutoFit/>
+          </a:bodyPr>
+          <a:lstStyle/>
+          <a:p>
+            <a:pPr algn="ctr"/>
+            <a:r>
+              <a:rPr lang="en-US" altLang="ko-KR" dirty="0" smtClean="0"/>
+              <a:t>Depth prediction</a:t>
+            </a:r>
+            <a:endParaRPr lang="ko-KR" altLang="en-US" dirty="0"/>
+          </a:p>
+        </p:txBody>
+      </p:sp>
+    </p:spTree>
+    <p:extLst>
+      <p:ext uri="{BB962C8B-B14F-4D97-AF65-F5344CB8AC3E}">
+        <p14:creationId xmlns:p14="http://schemas.microsoft.com/office/powerpoint/2010/main" val="969965549"/>
+      </p:ext>
+    </p:extLst>
+  </p:cSld>
+  <p:clrMapOvr>
+    <a:masterClrMapping/>
+  </p:clrMapOvr>
+</p:sld>
+</file>
+
+<file path=ppt/slides/slide6.xml><?xml version="1.0" encoding="utf-8"?>
+<p:sld xmlns:a="http://schemas.openxmlformats.org/drawingml/2006/main" xmlns:r="http://schemas.openxmlformats.org/officeDocument/2006/relationships" xmlns:p="http://schemas.openxmlformats.org/presentationml/2006/main">
+  <p:cSld>
+    <p:spTree>
+      <p:nvGrpSpPr>
+        <p:cNvPr id="1" name=""/>
+        <p:cNvGrpSpPr/>
+        <p:nvPr/>
+      </p:nvGrpSpPr>
+      <p:grpSpPr>
+        <a:xfrm>
+          <a:off x="0" y="0"/>
+          <a:ext cx="0" cy="0"/>
+          <a:chOff x="0" y="0"/>
+          <a:chExt cx="0" cy="0"/>
+        </a:xfrm>
+      </p:grpSpPr>
+      <p:pic>
+        <p:nvPicPr>
+          <p:cNvPr id="2" name="그림 1"/>
+          <p:cNvPicPr>
+            <a:picLocks noChangeAspect="1"/>
+          </p:cNvPicPr>
+          <p:nvPr/>
+        </p:nvPicPr>
+        <p:blipFill rotWithShape="1">
+          <a:blip r:embed="rId2"/>
+          <a:srcRect r="52973"/>
+          <a:stretch/>
+        </p:blipFill>
+        <p:spPr>
+          <a:xfrm>
+            <a:off x="4095751" y="826064"/>
+            <a:ext cx="2430587" cy="1800000"/>
+          </a:xfrm>
+          <a:prstGeom prst="rect">
+            <a:avLst/>
+          </a:prstGeom>
+        </p:spPr>
+      </p:pic>
+      <p:pic>
+        <p:nvPicPr>
+          <p:cNvPr id="3" name="그림 2"/>
+          <p:cNvPicPr>
+            <a:picLocks noChangeAspect="1"/>
+          </p:cNvPicPr>
+          <p:nvPr/>
+        </p:nvPicPr>
+        <p:blipFill rotWithShape="1">
+          <a:blip r:embed="rId2"/>
+          <a:srcRect l="52807" r="-41"/>
+          <a:stretch/>
+        </p:blipFill>
+        <p:spPr>
+          <a:xfrm>
+            <a:off x="6608024" y="826064"/>
+            <a:ext cx="2441256" cy="1800000"/>
+          </a:xfrm>
+          <a:prstGeom prst="rect">
+            <a:avLst/>
+          </a:prstGeom>
+        </p:spPr>
+      </p:pic>
+      <p:pic>
+        <p:nvPicPr>
+          <p:cNvPr id="3074" name="Picture 2" descr="bumblebee stereo camera image ì´ë¯¸ì§ ê²ìê²°ê³¼&quot;"/>
+          <p:cNvPicPr>
+            <a:picLocks noChangeAspect="1" noChangeArrowheads="1"/>
+          </p:cNvPicPr>
+          <p:nvPr/>
+        </p:nvPicPr>
+        <p:blipFill rotWithShape="1">
+          <a:blip r:embed="rId3">
+            <a:extLst>
+              <a:ext uri="{28A0092B-C50C-407E-A947-70E740481C1C}">
+                <a14:useLocalDpi xmlns:a14="http://schemas.microsoft.com/office/drawing/2010/main" val="0"/>
+              </a:ext>
+            </a:extLst>
+          </a:blip>
+          <a:srcRect l="848" t="35481" r="20524" b="10610"/>
+          <a:stretch/>
+        </p:blipFill>
+        <p:spPr bwMode="auto">
+          <a:xfrm>
+            <a:off x="1494065" y="1268215"/>
+            <a:ext cx="2520000" cy="915698"/>
+          </a:xfrm>
+          <a:prstGeom prst="rect">
+            <a:avLst/>
+          </a:prstGeom>
+          <a:noFill/>
+          <a:extLst>
+            <a:ext uri="{909E8E84-426E-40DD-AFC4-6F175D3DCCD1}">
+              <a14:hiddenFill xmlns:a14="http://schemas.microsoft.com/office/drawing/2010/main">
+                <a:solidFill>
+                  <a:srgbClr val="FFFFFF"/>
+                </a:solidFill>
+              </a14:hiddenFill>
+            </a:ext>
+          </a:extLst>
+        </p:spPr>
+      </p:pic>
+      <p:pic>
+        <p:nvPicPr>
+          <p:cNvPr id="4" name="그림 3"/>
+          <p:cNvPicPr>
+            <a:picLocks noChangeAspect="1"/>
+          </p:cNvPicPr>
+          <p:nvPr/>
+        </p:nvPicPr>
+        <p:blipFill>
+          <a:blip r:embed="rId4"/>
+          <a:stretch>
+            <a:fillRect/>
+          </a:stretch>
+        </p:blipFill>
+        <p:spPr>
+          <a:xfrm>
+            <a:off x="4472498" y="4436607"/>
+            <a:ext cx="2392593" cy="1800000"/>
+          </a:xfrm>
+          <a:prstGeom prst="rect">
+            <a:avLst/>
+          </a:prstGeom>
+        </p:spPr>
+      </p:pic>
+    </p:spTree>
+    <p:extLst>
+      <p:ext uri="{BB962C8B-B14F-4D97-AF65-F5344CB8AC3E}">
+        <p14:creationId xmlns:p14="http://schemas.microsoft.com/office/powerpoint/2010/main" val="1974289907"/>
+      </p:ext>
+    </p:extLst>
+  </p:cSld>
+  <p:clrMapOvr>
+    <a:masterClrMapping/>
+  </p:clrMapOvr>
+</p:sld>
+</file>
+
+<file path=ppt/slides/slide7.xml><?xml version="1.0" encoding="utf-8"?>
+<p:sld xmlns:a="http://schemas.openxmlformats.org/drawingml/2006/main" xmlns:r="http://schemas.openxmlformats.org/officeDocument/2006/relationships" xmlns:p="http://schemas.openxmlformats.org/presentationml/2006/main">
+  <p:cSld>
+    <p:spTree>
+      <p:nvGrpSpPr>
+        <p:cNvPr id="1" name=""/>
+        <p:cNvGrpSpPr/>
+        <p:nvPr/>
+      </p:nvGrpSpPr>
+      <p:grpSpPr>
+        <a:xfrm>
+          <a:off x="0" y="0"/>
+          <a:ext cx="0" cy="0"/>
+          <a:chOff x="0" y="0"/>
+          <a:chExt cx="0" cy="0"/>
+        </a:xfrm>
+      </p:grpSpPr>
+      <p:grpSp>
+        <p:nvGrpSpPr>
+          <p:cNvPr id="40" name="그룹 39"/>
+          <p:cNvGrpSpPr/>
+          <p:nvPr/>
+        </p:nvGrpSpPr>
+        <p:grpSpPr>
+          <a:xfrm>
+            <a:off x="1730829" y="1348747"/>
+            <a:ext cx="6080277" cy="4856220"/>
+            <a:chOff x="1730829" y="1348747"/>
+            <a:chExt cx="6080277" cy="4856220"/>
+          </a:xfrm>
+        </p:grpSpPr>
+        <p:pic>
+          <p:nvPicPr>
+            <p:cNvPr id="5" name="그림 4"/>
+            <p:cNvPicPr>
+              <a:picLocks noChangeAspect="1"/>
+            </p:cNvPicPr>
+            <p:nvPr/>
+          </p:nvPicPr>
+          <p:blipFill>
+            <a:blip r:embed="rId2">
+              <a:extLst>
+                <a:ext uri="{28A0092B-C50C-407E-A947-70E740481C1C}">
+                  <a14:useLocalDpi xmlns:a14="http://schemas.microsoft.com/office/drawing/2010/main" val="0"/>
+                </a:ext>
+              </a:extLst>
+            </a:blip>
+            <a:stretch>
+              <a:fillRect/>
+            </a:stretch>
+          </p:blipFill>
+          <p:spPr>
+            <a:xfrm>
+              <a:off x="1730829" y="1987748"/>
+              <a:ext cx="1920000" cy="1440000"/>
+            </a:xfrm>
+            <a:prstGeom prst="rect">
+              <a:avLst/>
+            </a:prstGeom>
+          </p:spPr>
+        </p:pic>
+        <p:pic>
+          <p:nvPicPr>
+            <p:cNvPr id="6" name="그림 5"/>
+            <p:cNvPicPr>
+              <a:picLocks noChangeAspect="1"/>
+            </p:cNvPicPr>
+            <p:nvPr/>
+          </p:nvPicPr>
+          <p:blipFill>
+            <a:blip r:embed="rId3">
+              <a:extLst>
+                <a:ext uri="{28A0092B-C50C-407E-A947-70E740481C1C}">
+                  <a14:useLocalDpi xmlns:a14="http://schemas.microsoft.com/office/drawing/2010/main" val="0"/>
+                </a:ext>
+              </a:extLst>
+            </a:blip>
+            <a:stretch>
+              <a:fillRect/>
+            </a:stretch>
+          </p:blipFill>
+          <p:spPr>
+            <a:xfrm>
+              <a:off x="5035784" y="4125966"/>
+              <a:ext cx="1920000" cy="1440000"/>
+            </a:xfrm>
+            <a:prstGeom prst="rect">
+              <a:avLst/>
+            </a:prstGeom>
+          </p:spPr>
+        </p:pic>
+        <p:pic>
+          <p:nvPicPr>
+            <p:cNvPr id="9" name="그림 8"/>
+            <p:cNvPicPr>
+              <a:picLocks noChangeAspect="1"/>
+            </p:cNvPicPr>
+            <p:nvPr/>
+          </p:nvPicPr>
+          <p:blipFill>
+            <a:blip r:embed="rId4">
+              <a:extLst>
+                <a:ext uri="{28A0092B-C50C-407E-A947-70E740481C1C}">
+                  <a14:useLocalDpi xmlns:a14="http://schemas.microsoft.com/office/drawing/2010/main" val="0"/>
+                </a:ext>
+              </a:extLst>
+            </a:blip>
+            <a:stretch>
+              <a:fillRect/>
+            </a:stretch>
+          </p:blipFill>
+          <p:spPr>
+            <a:xfrm>
+              <a:off x="5891107" y="1987748"/>
+              <a:ext cx="1919999" cy="1440000"/>
+            </a:xfrm>
+            <a:prstGeom prst="rect">
+              <a:avLst/>
+            </a:prstGeom>
+          </p:spPr>
+        </p:pic>
+        <p:pic>
+          <p:nvPicPr>
+            <p:cNvPr id="12" name="그림 11"/>
+            <p:cNvPicPr>
+              <a:picLocks noChangeAspect="1"/>
+            </p:cNvPicPr>
+            <p:nvPr/>
+          </p:nvPicPr>
+          <p:blipFill>
+            <a:blip r:embed="rId5">
+              <a:extLst>
+                <a:ext uri="{28A0092B-C50C-407E-A947-70E740481C1C}">
+                  <a14:useLocalDpi xmlns:a14="http://schemas.microsoft.com/office/drawing/2010/main" val="0"/>
+                </a:ext>
+              </a:extLst>
+            </a:blip>
+            <a:stretch>
+              <a:fillRect/>
+            </a:stretch>
+          </p:blipFill>
+          <p:spPr>
+            <a:xfrm>
+              <a:off x="2592857" y="4125966"/>
+              <a:ext cx="1920000" cy="1440000"/>
+            </a:xfrm>
+            <a:prstGeom prst="rect">
+              <a:avLst/>
+            </a:prstGeom>
+          </p:spPr>
+        </p:pic>
+        <p:sp>
+          <p:nvSpPr>
+            <p:cNvPr id="13" name="TextBox 12"/>
+            <p:cNvSpPr txBox="1"/>
+            <p:nvPr/>
+          </p:nvSpPr>
+          <p:spPr>
+            <a:xfrm>
+              <a:off x="2040010" y="1618416"/>
+              <a:ext cx="1301638" cy="369332"/>
+            </a:xfrm>
+            <a:prstGeom prst="rect">
+              <a:avLst/>
+            </a:prstGeom>
+            <a:noFill/>
+          </p:spPr>
+          <p:txBody>
+            <a:bodyPr wrap="none" rtlCol="0">
+              <a:spAutoFit/>
+            </a:bodyPr>
+            <a:lstStyle/>
+            <a:p>
+              <a:r>
+                <a:rPr lang="en-US" altLang="ko-KR" dirty="0" smtClean="0"/>
+                <a:t>Left image</a:t>
+              </a:r>
+              <a:endParaRPr lang="ko-KR" altLang="en-US" dirty="0"/>
+            </a:p>
+          </p:txBody>
+        </p:sp>
+        <p:sp>
+          <p:nvSpPr>
+            <p:cNvPr id="14" name="TextBox 13"/>
+            <p:cNvSpPr txBox="1"/>
+            <p:nvPr/>
+          </p:nvSpPr>
+          <p:spPr>
+            <a:xfrm>
+              <a:off x="6080896" y="1348747"/>
+              <a:ext cx="1540422" cy="646331"/>
+            </a:xfrm>
+            <a:prstGeom prst="rect">
+              <a:avLst/>
+            </a:prstGeom>
+            <a:noFill/>
+          </p:spPr>
+          <p:txBody>
+            <a:bodyPr wrap="none" rtlCol="0">
+              <a:spAutoFit/>
+            </a:bodyPr>
+            <a:lstStyle/>
+            <a:p>
+              <a:pPr algn="ctr"/>
+              <a:r>
+                <a:rPr lang="en-US" altLang="ko-KR" dirty="0" smtClean="0"/>
+                <a:t>Left disparity</a:t>
+              </a:r>
+            </a:p>
+            <a:p>
+              <a:pPr algn="ctr"/>
+              <a:r>
+                <a:rPr lang="en-US" altLang="ko-KR" dirty="0" smtClean="0"/>
+                <a:t>prediction</a:t>
+              </a:r>
+              <a:endParaRPr lang="ko-KR" altLang="en-US" dirty="0"/>
+            </a:p>
+          </p:txBody>
+        </p:sp>
+        <p:sp>
+          <p:nvSpPr>
+            <p:cNvPr id="15" name="TextBox 14"/>
+            <p:cNvSpPr txBox="1"/>
+            <p:nvPr/>
+          </p:nvSpPr>
+          <p:spPr>
+            <a:xfrm>
+              <a:off x="2719585" y="5558636"/>
+              <a:ext cx="1666545" cy="646331"/>
+            </a:xfrm>
+            <a:prstGeom prst="rect">
+              <a:avLst/>
+            </a:prstGeom>
+            <a:noFill/>
+          </p:spPr>
+          <p:txBody>
+            <a:bodyPr wrap="none" rtlCol="0">
+              <a:spAutoFit/>
+            </a:bodyPr>
+            <a:lstStyle/>
+            <a:p>
+              <a:pPr algn="ctr"/>
+              <a:r>
+                <a:rPr lang="en-US" altLang="ko-KR" dirty="0" smtClean="0"/>
+                <a:t>Reconstructed</a:t>
+              </a:r>
+            </a:p>
+            <a:p>
+              <a:pPr algn="ctr"/>
+              <a:r>
+                <a:rPr lang="en-US" altLang="ko-KR" dirty="0" smtClean="0"/>
+                <a:t>right image</a:t>
+              </a:r>
+              <a:endParaRPr lang="ko-KR" altLang="en-US" dirty="0"/>
+            </a:p>
+          </p:txBody>
+        </p:sp>
+        <p:sp>
+          <p:nvSpPr>
+            <p:cNvPr id="16" name="TextBox 15"/>
+            <p:cNvSpPr txBox="1"/>
+            <p:nvPr/>
+          </p:nvSpPr>
+          <p:spPr>
+            <a:xfrm>
+              <a:off x="5035040" y="5558636"/>
+              <a:ext cx="1921488" cy="369332"/>
+            </a:xfrm>
+            <a:prstGeom prst="rect">
+              <a:avLst/>
+            </a:prstGeom>
+            <a:noFill/>
+          </p:spPr>
+          <p:txBody>
+            <a:bodyPr wrap="none" rtlCol="0">
+              <a:spAutoFit/>
+            </a:bodyPr>
+            <a:lstStyle/>
+            <a:p>
+              <a:pPr algn="ctr"/>
+              <a:r>
+                <a:rPr lang="en-US" altLang="ko-KR" dirty="0" smtClean="0"/>
+                <a:t>True right image</a:t>
+              </a:r>
+              <a:endParaRPr lang="ko-KR" altLang="en-US" dirty="0"/>
+            </a:p>
+          </p:txBody>
+        </p:sp>
+        <p:sp>
+          <p:nvSpPr>
+            <p:cNvPr id="17" name="모서리가 둥근 직사각형 16"/>
+            <p:cNvSpPr/>
+            <p:nvPr/>
+          </p:nvSpPr>
+          <p:spPr>
+            <a:xfrm>
+              <a:off x="3870968" y="1987748"/>
+              <a:ext cx="1800000" cy="1440000"/>
+            </a:xfrm>
+            <a:prstGeom prst="roundRect">
+              <a:avLst/>
+            </a:prstGeom>
+            <a:ln w="57150"/>
+          </p:spPr>
+          <p:style>
+            <a:lnRef idx="2">
+              <a:schemeClr val="accent5"/>
+            </a:lnRef>
+            <a:fillRef idx="1">
+              <a:schemeClr val="lt1"/>
+            </a:fillRef>
+            <a:effectRef idx="0">
+              <a:schemeClr val="accent5"/>
+            </a:effectRef>
+            <a:fontRef idx="minor">
+              <a:schemeClr val="dk1"/>
+            </a:fontRef>
+          </p:style>
+          <p:txBody>
+            <a:bodyPr wrap="none" rtlCol="0" anchor="ctr"/>
+            <a:lstStyle/>
+            <a:p>
+              <a:pPr algn="ctr"/>
+              <a:r>
+                <a:rPr lang="en-US" altLang="ko-KR" dirty="0" smtClean="0"/>
+                <a:t>Monocular</a:t>
+              </a:r>
+            </a:p>
+            <a:p>
+              <a:pPr algn="ctr"/>
+              <a:r>
+                <a:rPr lang="en-US" altLang="ko-KR" dirty="0" smtClean="0"/>
+                <a:t>Depth </a:t>
+              </a:r>
+            </a:p>
+            <a:p>
+              <a:pPr algn="ctr"/>
+              <a:r>
+                <a:rPr lang="en-US" altLang="ko-KR" dirty="0" smtClean="0"/>
+                <a:t>Estimation</a:t>
+              </a:r>
+              <a:endParaRPr lang="ko-KR" altLang="en-US" dirty="0"/>
+            </a:p>
+          </p:txBody>
+        </p:sp>
+        <p:cxnSp>
+          <p:nvCxnSpPr>
+            <p:cNvPr id="19" name="직선 화살표 연결선 18"/>
+            <p:cNvCxnSpPr>
+              <a:stCxn id="5" idx="3"/>
+              <a:endCxn id="17" idx="1"/>
+            </p:cNvCxnSpPr>
+            <p:nvPr/>
+          </p:nvCxnSpPr>
+          <p:spPr>
+            <a:xfrm>
+              <a:off x="3650829" y="2707748"/>
+              <a:ext cx="220139" cy="0"/>
+            </a:xfrm>
+            <a:prstGeom prst="straightConnector1">
+              <a:avLst/>
+            </a:prstGeom>
+            <a:ln w="19050">
+              <a:solidFill>
+                <a:schemeClr val="tx1"/>
+              </a:solidFill>
+              <a:tailEnd type="triangle"/>
+            </a:ln>
+          </p:spPr>
+          <p:style>
+            <a:lnRef idx="1">
+              <a:schemeClr val="accent1"/>
+            </a:lnRef>
+            <a:fillRef idx="0">
+              <a:schemeClr val="accent1"/>
+            </a:fillRef>
+            <a:effectRef idx="0">
+              <a:schemeClr val="accent1"/>
+            </a:effectRef>
+            <a:fontRef idx="minor">
+              <a:schemeClr val="tx1"/>
+            </a:fontRef>
+          </p:style>
+        </p:cxnSp>
+        <p:cxnSp>
+          <p:nvCxnSpPr>
+            <p:cNvPr id="21" name="직선 화살표 연결선 20"/>
+            <p:cNvCxnSpPr>
+              <a:stCxn id="17" idx="3"/>
+              <a:endCxn id="9" idx="1"/>
+            </p:cNvCxnSpPr>
+            <p:nvPr/>
+          </p:nvCxnSpPr>
+          <p:spPr>
+            <a:xfrm>
+              <a:off x="5670968" y="2707748"/>
+              <a:ext cx="220139" cy="0"/>
+            </a:xfrm>
+            <a:prstGeom prst="straightConnector1">
+              <a:avLst/>
+            </a:prstGeom>
+            <a:ln w="19050">
+              <a:solidFill>
+                <a:schemeClr val="tx1"/>
+              </a:solidFill>
+              <a:tailEnd type="triangle"/>
+            </a:ln>
+          </p:spPr>
+          <p:style>
+            <a:lnRef idx="1">
+              <a:schemeClr val="accent1"/>
+            </a:lnRef>
+            <a:fillRef idx="0">
+              <a:schemeClr val="accent1"/>
+            </a:fillRef>
+            <a:effectRef idx="0">
+              <a:schemeClr val="accent1"/>
+            </a:effectRef>
+            <a:fontRef idx="minor">
+              <a:schemeClr val="tx1"/>
+            </a:fontRef>
+          </p:style>
+        </p:cxnSp>
+        <p:cxnSp>
+          <p:nvCxnSpPr>
+            <p:cNvPr id="27" name="꺾인 연결선 26"/>
+            <p:cNvCxnSpPr>
+              <a:stCxn id="9" idx="2"/>
+              <a:endCxn id="12" idx="0"/>
+            </p:cNvCxnSpPr>
+            <p:nvPr/>
+          </p:nvCxnSpPr>
+          <p:spPr>
+            <a:xfrm rot="5400000">
+              <a:off x="4852873" y="2127732"/>
+              <a:ext cx="698218" cy="3298250"/>
+            </a:xfrm>
+            <a:prstGeom prst="bentConnector3">
+              <a:avLst>
+                <a:gd name="adj1" fmla="val 32850"/>
+              </a:avLst>
+            </a:prstGeom>
+            <a:ln w="19050">
+              <a:solidFill>
+                <a:schemeClr val="tx1"/>
+              </a:solidFill>
+              <a:tailEnd type="triangle"/>
+            </a:ln>
+          </p:spPr>
+          <p:style>
+            <a:lnRef idx="1">
+              <a:schemeClr val="accent1"/>
+            </a:lnRef>
+            <a:fillRef idx="0">
+              <a:schemeClr val="accent1"/>
+            </a:fillRef>
+            <a:effectRef idx="0">
+              <a:schemeClr val="accent1"/>
+            </a:effectRef>
+            <a:fontRef idx="minor">
+              <a:schemeClr val="tx1"/>
+            </a:fontRef>
+          </p:style>
+        </p:cxnSp>
+        <p:sp>
+          <p:nvSpPr>
+            <p:cNvPr id="28" name="타원 27"/>
+            <p:cNvSpPr/>
+            <p:nvPr/>
+          </p:nvSpPr>
+          <p:spPr>
+            <a:xfrm>
+              <a:off x="4617534" y="4692531"/>
+              <a:ext cx="306867" cy="306867"/>
+            </a:xfrm>
+            <a:prstGeom prst="ellipse">
+              <a:avLst/>
+            </a:prstGeom>
+            <a:ln w="19050"/>
+          </p:spPr>
+          <p:style>
+            <a:lnRef idx="2">
+              <a:schemeClr val="dk1"/>
+            </a:lnRef>
+            <a:fillRef idx="1">
+              <a:schemeClr val="lt1"/>
+            </a:fillRef>
+            <a:effectRef idx="0">
+              <a:schemeClr val="dk1"/>
+            </a:effectRef>
+            <a:fontRef idx="minor">
+              <a:schemeClr val="dk1"/>
+            </a:fontRef>
+          </p:style>
+          <p:txBody>
+            <a:bodyPr rtlCol="0" anchor="ctr"/>
+            <a:lstStyle/>
+            <a:p>
+              <a:pPr algn="ctr"/>
+              <a:r>
+                <a:rPr lang="ko-KR" altLang="en-US" b="1" dirty="0" smtClean="0"/>
+                <a:t>─</a:t>
+              </a:r>
+              <a:endParaRPr lang="ko-KR" altLang="en-US" b="1" dirty="0"/>
+            </a:p>
+          </p:txBody>
+        </p:sp>
+        <p:cxnSp>
+          <p:nvCxnSpPr>
+            <p:cNvPr id="32" name="꺾인 연결선 31"/>
+            <p:cNvCxnSpPr>
+              <a:stCxn id="5" idx="2"/>
+              <a:endCxn id="12" idx="0"/>
+            </p:cNvCxnSpPr>
+            <p:nvPr/>
+          </p:nvCxnSpPr>
+          <p:spPr>
+            <a:xfrm rot="16200000" flipH="1">
+              <a:off x="2772734" y="3345843"/>
+              <a:ext cx="698218" cy="862028"/>
+            </a:xfrm>
+            <a:prstGeom prst="bentConnector3">
+              <a:avLst>
+                <a:gd name="adj1" fmla="val 32850"/>
+              </a:avLst>
+            </a:prstGeom>
+            <a:ln w="19050">
+              <a:solidFill>
+                <a:schemeClr val="tx1"/>
+              </a:solidFill>
+              <a:tailEnd type="triangle"/>
+            </a:ln>
+          </p:spPr>
+          <p:style>
+            <a:lnRef idx="1">
+              <a:schemeClr val="accent1"/>
+            </a:lnRef>
+            <a:fillRef idx="0">
+              <a:schemeClr val="accent1"/>
+            </a:fillRef>
+            <a:effectRef idx="0">
+              <a:schemeClr val="accent1"/>
+            </a:effectRef>
+            <a:fontRef idx="minor">
+              <a:schemeClr val="tx1"/>
+            </a:fontRef>
+          </p:style>
+        </p:cxnSp>
+        <p:cxnSp>
+          <p:nvCxnSpPr>
+            <p:cNvPr id="34" name="직선 화살표 연결선 33"/>
+            <p:cNvCxnSpPr>
+              <a:stCxn id="28" idx="0"/>
+              <a:endCxn id="17" idx="2"/>
+            </p:cNvCxnSpPr>
+            <p:nvPr/>
+          </p:nvCxnSpPr>
+          <p:spPr>
+            <a:xfrm flipV="1">
+              <a:off x="4770968" y="3427748"/>
+              <a:ext cx="0" cy="1264783"/>
+            </a:xfrm>
+            <a:prstGeom prst="straightConnector1">
+              <a:avLst/>
+            </a:prstGeom>
+            <a:ln w="28575">
+              <a:solidFill>
+                <a:srgbClr val="FF0000"/>
+              </a:solidFill>
+              <a:tailEnd type="triangle"/>
+            </a:ln>
+          </p:spPr>
+          <p:style>
+            <a:lnRef idx="1">
+              <a:schemeClr val="accent1"/>
+            </a:lnRef>
+            <a:fillRef idx="0">
+              <a:schemeClr val="accent1"/>
+            </a:fillRef>
+            <a:effectRef idx="0">
+              <a:schemeClr val="accent1"/>
+            </a:effectRef>
+            <a:fontRef idx="minor">
+              <a:schemeClr val="tx1"/>
+            </a:fontRef>
+          </p:style>
+        </p:cxnSp>
+        <p:sp>
+          <p:nvSpPr>
+            <p:cNvPr id="39" name="TextBox 38"/>
+            <p:cNvSpPr txBox="1"/>
+            <p:nvPr/>
+          </p:nvSpPr>
+          <p:spPr>
+            <a:xfrm>
+              <a:off x="4748705" y="3690676"/>
+              <a:ext cx="1931619" cy="369332"/>
+            </a:xfrm>
+            <a:prstGeom prst="rect">
+              <a:avLst/>
+            </a:prstGeom>
+            <a:noFill/>
+          </p:spPr>
+          <p:txBody>
+            <a:bodyPr wrap="none" rtlCol="0">
+              <a:spAutoFit/>
+            </a:bodyPr>
+            <a:lstStyle/>
+            <a:p>
+              <a:pPr algn="ctr"/>
+              <a:r>
+                <a:rPr lang="en-US" altLang="ko-KR" dirty="0" smtClean="0">
+                  <a:solidFill>
+                    <a:srgbClr val="FF0000"/>
+                  </a:solidFill>
+                </a:rPr>
+                <a:t>Photometric loss</a:t>
+              </a:r>
+              <a:endParaRPr lang="ko-KR" altLang="en-US" dirty="0">
+                <a:solidFill>
+                  <a:srgbClr val="FF0000"/>
+                </a:solidFill>
+              </a:endParaRPr>
+            </a:p>
+          </p:txBody>
+        </p:sp>
+      </p:grpSp>
+    </p:spTree>
+    <p:extLst>
+      <p:ext uri="{BB962C8B-B14F-4D97-AF65-F5344CB8AC3E}">
+        <p14:creationId xmlns:p14="http://schemas.microsoft.com/office/powerpoint/2010/main" val="3719530433"/>
+      </p:ext>
+    </p:extLst>
+  </p:cSld>
+  <p:clrMapOvr>
+    <a:masterClrMapping/>
+  </p:clrMapOvr>
+</p:sld>
+</file>
+
+<file path=ppt/slides/slide8.xml><?xml version="1.0" encoding="utf-8"?>
+<p:sld xmlns:a="http://schemas.openxmlformats.org/drawingml/2006/main" xmlns:r="http://schemas.openxmlformats.org/officeDocument/2006/relationships" xmlns:p="http://schemas.openxmlformats.org/presentationml/2006/main">
+  <p:cSld>
+    <p:spTree>
+      <p:nvGrpSpPr>
+        <p:cNvPr id="1" name=""/>
+        <p:cNvGrpSpPr/>
+        <p:nvPr/>
+      </p:nvGrpSpPr>
+      <p:grpSpPr>
+        <a:xfrm>
+          <a:off x="0" y="0"/>
+          <a:ext cx="0" cy="0"/>
+          <a:chOff x="0" y="0"/>
+          <a:chExt cx="0" cy="0"/>
+        </a:xfrm>
+      </p:grpSpPr>
+      <p:grpSp>
+        <p:nvGrpSpPr>
+          <p:cNvPr id="9" name="그룹 8"/>
+          <p:cNvGrpSpPr/>
+          <p:nvPr/>
+        </p:nvGrpSpPr>
+        <p:grpSpPr>
+          <a:xfrm>
+            <a:off x="2061088" y="2617531"/>
+            <a:ext cx="5720981" cy="2181692"/>
+            <a:chOff x="2061088" y="2617531"/>
+            <a:chExt cx="5720981" cy="2181692"/>
+          </a:xfrm>
+        </p:grpSpPr>
+        <p:pic>
+          <p:nvPicPr>
+            <p:cNvPr id="2" name="그림 1"/>
+            <p:cNvPicPr>
+              <a:picLocks noChangeAspect="1"/>
+            </p:cNvPicPr>
+            <p:nvPr/>
+          </p:nvPicPr>
+          <p:blipFill>
+            <a:blip r:embed="rId2">
+              <a:extLst>
+                <a:ext uri="{28A0092B-C50C-407E-A947-70E740481C1C}">
+                  <a14:useLocalDpi xmlns:a14="http://schemas.microsoft.com/office/drawing/2010/main" val="0"/>
+                </a:ext>
+              </a:extLst>
+            </a:blip>
+            <a:stretch>
+              <a:fillRect/>
+            </a:stretch>
+          </p:blipFill>
+          <p:spPr>
+            <a:xfrm>
+              <a:off x="3514780" y="2845526"/>
+              <a:ext cx="2767584" cy="1645920"/>
+            </a:xfrm>
+            <a:prstGeom prst="rect">
+              <a:avLst/>
+            </a:prstGeom>
+          </p:spPr>
+        </p:pic>
+        <p:sp>
+          <p:nvSpPr>
+            <p:cNvPr id="3" name="TextBox 2"/>
+            <p:cNvSpPr txBox="1"/>
+            <p:nvPr/>
+          </p:nvSpPr>
+          <p:spPr>
+            <a:xfrm>
+              <a:off x="2939142" y="4374639"/>
+              <a:ext cx="1248099" cy="307777"/>
+            </a:xfrm>
+            <a:prstGeom prst="rect">
+              <a:avLst/>
+            </a:prstGeom>
+            <a:noFill/>
+          </p:spPr>
+          <p:txBody>
+            <a:bodyPr wrap="none" rtlCol="0">
+              <a:spAutoFit/>
+            </a:bodyPr>
+            <a:lstStyle/>
+            <a:p>
+              <a:r>
+                <a:rPr lang="en-US" altLang="ko-KR" sz="1400" dirty="0"/>
+                <a:t>s</a:t>
+              </a:r>
+              <a:r>
+                <a:rPr lang="en-US" altLang="ko-KR" sz="1400" dirty="0" smtClean="0"/>
+                <a:t>ource frame</a:t>
+              </a:r>
+              <a:endParaRPr lang="ko-KR" altLang="en-US" sz="1400" dirty="0"/>
+            </a:p>
+          </p:txBody>
+        </p:sp>
+        <p:sp>
+          <p:nvSpPr>
+            <p:cNvPr id="4" name="TextBox 3"/>
+            <p:cNvSpPr txBox="1"/>
+            <p:nvPr/>
+          </p:nvSpPr>
+          <p:spPr>
+            <a:xfrm>
+              <a:off x="5434564" y="4491446"/>
+              <a:ext cx="1198405" cy="307777"/>
+            </a:xfrm>
+            <a:prstGeom prst="rect">
+              <a:avLst/>
+            </a:prstGeom>
+            <a:noFill/>
+          </p:spPr>
+          <p:txBody>
+            <a:bodyPr wrap="none" rtlCol="0">
+              <a:spAutoFit/>
+            </a:bodyPr>
+            <a:lstStyle/>
+            <a:p>
+              <a:r>
+                <a:rPr lang="en-US" altLang="ko-KR" sz="1400" dirty="0" smtClean="0"/>
+                <a:t>target frame</a:t>
+              </a:r>
+              <a:endParaRPr lang="ko-KR" altLang="en-US" sz="1400" dirty="0"/>
+            </a:p>
+          </p:txBody>
+        </p:sp>
+        <p:pic>
+          <p:nvPicPr>
+            <p:cNvPr id="5" name="그림 4"/>
+            <p:cNvPicPr>
+              <a:picLocks noChangeAspect="1"/>
+            </p:cNvPicPr>
+            <p:nvPr/>
+          </p:nvPicPr>
+          <p:blipFill>
+            <a:blip r:embed="rId3">
+              <a:extLst>
+                <a:ext uri="{28A0092B-C50C-407E-A947-70E740481C1C}">
+                  <a14:useLocalDpi xmlns:a14="http://schemas.microsoft.com/office/drawing/2010/main" val="0"/>
+                </a:ext>
+              </a:extLst>
+            </a:blip>
+            <a:stretch>
+              <a:fillRect/>
+            </a:stretch>
+          </p:blipFill>
+          <p:spPr>
+            <a:xfrm>
+              <a:off x="2061088" y="2956085"/>
+              <a:ext cx="1440000" cy="1080000"/>
+            </a:xfrm>
+            <a:prstGeom prst="rect">
+              <a:avLst/>
+            </a:prstGeom>
+          </p:spPr>
+        </p:pic>
+        <p:pic>
+          <p:nvPicPr>
+            <p:cNvPr id="6" name="그림 5"/>
+            <p:cNvPicPr>
+              <a:picLocks noChangeAspect="1"/>
+            </p:cNvPicPr>
+            <p:nvPr/>
+          </p:nvPicPr>
+          <p:blipFill>
+            <a:blip r:embed="rId4">
+              <a:extLst>
+                <a:ext uri="{28A0092B-C50C-407E-A947-70E740481C1C}">
+                  <a14:useLocalDpi xmlns:a14="http://schemas.microsoft.com/office/drawing/2010/main" val="0"/>
+                </a:ext>
+              </a:extLst>
+            </a:blip>
+            <a:stretch>
+              <a:fillRect/>
+            </a:stretch>
+          </p:blipFill>
+          <p:spPr>
+            <a:xfrm>
+              <a:off x="6342069" y="2956085"/>
+              <a:ext cx="1440000" cy="1080000"/>
+            </a:xfrm>
+            <a:prstGeom prst="rect">
+              <a:avLst/>
+            </a:prstGeom>
+          </p:spPr>
+        </p:pic>
+        <p:sp>
+          <p:nvSpPr>
+            <p:cNvPr id="7" name="TextBox 6"/>
+            <p:cNvSpPr txBox="1"/>
+            <p:nvPr/>
+          </p:nvSpPr>
+          <p:spPr>
+            <a:xfrm>
+              <a:off x="2141009" y="2617531"/>
+              <a:ext cx="1280159" cy="307777"/>
+            </a:xfrm>
+            <a:prstGeom prst="rect">
+              <a:avLst/>
+            </a:prstGeom>
+            <a:noFill/>
+          </p:spPr>
+          <p:txBody>
+            <a:bodyPr wrap="none" rtlCol="0">
+              <a:spAutoFit/>
+            </a:bodyPr>
+            <a:lstStyle/>
+            <a:p>
+              <a:pPr algn="ctr"/>
+              <a:r>
+                <a:rPr lang="en-US" altLang="ko-KR" sz="1400" dirty="0"/>
+                <a:t>s</a:t>
+              </a:r>
+              <a:r>
+                <a:rPr lang="en-US" altLang="ko-KR" sz="1400" dirty="0" smtClean="0"/>
+                <a:t>ource image</a:t>
+              </a:r>
+              <a:endParaRPr lang="ko-KR" altLang="en-US" sz="1400" dirty="0"/>
+            </a:p>
+          </p:txBody>
+        </p:sp>
+        <p:sp>
+          <p:nvSpPr>
+            <p:cNvPr id="8" name="TextBox 7"/>
+            <p:cNvSpPr txBox="1"/>
+            <p:nvPr/>
+          </p:nvSpPr>
+          <p:spPr>
+            <a:xfrm>
+              <a:off x="6446836" y="2617531"/>
+              <a:ext cx="1230465" cy="307777"/>
+            </a:xfrm>
+            <a:prstGeom prst="rect">
+              <a:avLst/>
+            </a:prstGeom>
+            <a:noFill/>
+          </p:spPr>
+          <p:txBody>
+            <a:bodyPr wrap="none" rtlCol="0">
+              <a:spAutoFit/>
+            </a:bodyPr>
+            <a:lstStyle/>
+            <a:p>
+              <a:pPr algn="ctr"/>
+              <a:r>
+                <a:rPr lang="en-US" altLang="ko-KR" sz="1400" dirty="0" smtClean="0"/>
+                <a:t>target image</a:t>
+              </a:r>
+              <a:endParaRPr lang="ko-KR" altLang="en-US" sz="1400" dirty="0"/>
+            </a:p>
+          </p:txBody>
+        </p:sp>
+      </p:grpSp>
+    </p:spTree>
+    <p:extLst>
+      <p:ext uri="{BB962C8B-B14F-4D97-AF65-F5344CB8AC3E}">
+        <p14:creationId xmlns:p14="http://schemas.microsoft.com/office/powerpoint/2010/main" val="1385220542"/>
+      </p:ext>
+    </p:extLst>
+  </p:cSld>
+  <p:clrMapOvr>
+    <a:masterClrMapping/>
+  </p:clrMapOvr>
+</p:sld>
+</file>
+
+<file path=ppt/slides/slide9.xml><?xml version="1.0" encoding="utf-8"?>
+<p:sld xmlns:a="http://schemas.openxmlformats.org/drawingml/2006/main" xmlns:r="http://schemas.openxmlformats.org/officeDocument/2006/relationships" xmlns:p="http://schemas.openxmlformats.org/presentationml/2006/main">
+  <p:cSld>
+    <p:spTree>
+      <p:nvGrpSpPr>
+        <p:cNvPr id="1" name=""/>
+        <p:cNvGrpSpPr/>
+        <p:nvPr/>
+      </p:nvGrpSpPr>
+      <p:grpSpPr>
+        <a:xfrm>
+          <a:off x="0" y="0"/>
+          <a:ext cx="0" cy="0"/>
+          <a:chOff x="0" y="0"/>
+          <a:chExt cx="0" cy="0"/>
+        </a:xfrm>
+      </p:grpSpPr>
+      <p:grpSp>
+        <p:nvGrpSpPr>
+          <p:cNvPr id="46" name="그룹 45"/>
+          <p:cNvGrpSpPr/>
+          <p:nvPr/>
+        </p:nvGrpSpPr>
+        <p:grpSpPr>
+          <a:xfrm>
+            <a:off x="1845194" y="1604071"/>
+            <a:ext cx="8721147" cy="3178973"/>
+            <a:chOff x="1845194" y="1604071"/>
+            <a:chExt cx="8721147" cy="3178973"/>
+          </a:xfrm>
+        </p:grpSpPr>
+        <p:sp>
+          <p:nvSpPr>
+            <p:cNvPr id="16" name="직사각형 15"/>
+            <p:cNvSpPr/>
+            <p:nvPr/>
+          </p:nvSpPr>
+          <p:spPr>
+            <a:xfrm>
+              <a:off x="4713514" y="3564322"/>
+              <a:ext cx="478968" cy="517820"/>
+            </a:xfrm>
+            <a:prstGeom prst="rect">
+              <a:avLst/>
+            </a:prstGeom>
+            <a:solidFill>
+              <a:schemeClr val="bg1"/>
+            </a:solidFill>
+            <a:ln>
+              <a:noFill/>
+            </a:ln>
+          </p:spPr>
+          <p:style>
+            <a:lnRef idx="2">
+              <a:schemeClr val="accent1">
+                <a:shade val="50000"/>
+              </a:schemeClr>
+            </a:lnRef>
+            <a:fillRef idx="1">
+              <a:schemeClr val="accent1"/>
+            </a:fillRef>
+            <a:effectRef idx="0">
+              <a:schemeClr val="accent1"/>
+            </a:effectRef>
+            <a:fontRef idx="minor">
+              <a:schemeClr val="lt1"/>
+            </a:fontRef>
+          </p:style>
+          <p:txBody>
+            <a:bodyPr rtlCol="0" anchor="ctr"/>
+            <a:lstStyle/>
+            <a:p>
+              <a:pPr algn="ctr"/>
+              <a:endParaRPr lang="ko-KR" altLang="en-US"/>
+            </a:p>
+          </p:txBody>
+        </p:sp>
+        <p:sp>
+          <p:nvSpPr>
+            <p:cNvPr id="10" name="직사각형 9"/>
+            <p:cNvSpPr/>
+            <p:nvPr/>
+          </p:nvSpPr>
+          <p:spPr>
+            <a:xfrm>
+              <a:off x="4713514" y="2083864"/>
+              <a:ext cx="478968" cy="517820"/>
+            </a:xfrm>
+            <a:prstGeom prst="rect">
+              <a:avLst/>
+            </a:prstGeom>
+            <a:solidFill>
+              <a:schemeClr val="bg1"/>
+            </a:solidFill>
+            <a:ln>
+              <a:noFill/>
+            </a:ln>
+          </p:spPr>
+          <p:style>
+            <a:lnRef idx="2">
+              <a:schemeClr val="accent1">
+                <a:shade val="50000"/>
+              </a:schemeClr>
+            </a:lnRef>
+            <a:fillRef idx="1">
+              <a:schemeClr val="accent1"/>
+            </a:fillRef>
+            <a:effectRef idx="0">
+              <a:schemeClr val="accent1"/>
+            </a:effectRef>
+            <a:fontRef idx="minor">
+              <a:schemeClr val="lt1"/>
+            </a:fontRef>
+          </p:style>
+          <p:txBody>
+            <a:bodyPr rtlCol="0" anchor="ctr"/>
+            <a:lstStyle/>
+            <a:p>
+              <a:pPr algn="ctr"/>
+              <a:endParaRPr lang="ko-KR" altLang="en-US"/>
+            </a:p>
+          </p:txBody>
+        </p:sp>
+        <p:pic>
+          <p:nvPicPr>
+            <p:cNvPr id="2" name="그림 1"/>
+            <p:cNvPicPr>
+              <a:picLocks noChangeAspect="1"/>
+            </p:cNvPicPr>
+            <p:nvPr/>
+          </p:nvPicPr>
+          <p:blipFill>
+            <a:blip r:embed="rId2">
+              <a:extLst>
+                <a:ext uri="{28A0092B-C50C-407E-A947-70E740481C1C}">
+                  <a14:useLocalDpi xmlns:a14="http://schemas.microsoft.com/office/drawing/2010/main" val="0"/>
+                </a:ext>
+              </a:extLst>
+            </a:blip>
+            <a:stretch>
+              <a:fillRect/>
+            </a:stretch>
+          </p:blipFill>
+          <p:spPr>
+            <a:xfrm>
+              <a:off x="1859416" y="1824718"/>
+              <a:ext cx="3248025" cy="2533650"/>
+            </a:xfrm>
+            <a:prstGeom prst="rect">
+              <a:avLst/>
+            </a:prstGeom>
+          </p:spPr>
+        </p:pic>
+        <p:pic>
+          <p:nvPicPr>
+            <p:cNvPr id="3" name="그림 2"/>
+            <p:cNvPicPr>
+              <a:picLocks noChangeAspect="1"/>
+            </p:cNvPicPr>
+            <p:nvPr/>
+          </p:nvPicPr>
+          <p:blipFill>
+            <a:blip r:embed="rId3">
+              <a:extLst>
+                <a:ext uri="{28A0092B-C50C-407E-A947-70E740481C1C}">
+                  <a14:useLocalDpi xmlns:a14="http://schemas.microsoft.com/office/drawing/2010/main" val="0"/>
+                </a:ext>
+              </a:extLst>
+            </a:blip>
+            <a:stretch>
+              <a:fillRect/>
+            </a:stretch>
+          </p:blipFill>
+          <p:spPr>
+            <a:xfrm>
+              <a:off x="5366658" y="2551543"/>
+              <a:ext cx="1440000" cy="1080000"/>
+            </a:xfrm>
+            <a:prstGeom prst="rect">
+              <a:avLst/>
+            </a:prstGeom>
+          </p:spPr>
+        </p:pic>
+        <p:pic>
+          <p:nvPicPr>
+            <p:cNvPr id="4" name="그림 3"/>
+            <p:cNvPicPr>
+              <a:picLocks noChangeAspect="1"/>
+            </p:cNvPicPr>
+            <p:nvPr/>
+          </p:nvPicPr>
+          <p:blipFill>
+            <a:blip r:embed="rId4">
+              <a:extLst>
+                <a:ext uri="{28A0092B-C50C-407E-A947-70E740481C1C}">
+                  <a14:useLocalDpi xmlns:a14="http://schemas.microsoft.com/office/drawing/2010/main" val="0"/>
+                </a:ext>
+              </a:extLst>
+            </a:blip>
+            <a:stretch>
+              <a:fillRect/>
+            </a:stretch>
+          </p:blipFill>
+          <p:spPr>
+            <a:xfrm>
+              <a:off x="7219286" y="2551543"/>
+              <a:ext cx="1440000" cy="1080000"/>
+            </a:xfrm>
+            <a:prstGeom prst="rect">
+              <a:avLst/>
+            </a:prstGeom>
+          </p:spPr>
+        </p:pic>
+        <p:pic>
+          <p:nvPicPr>
+            <p:cNvPr id="5" name="그림 4"/>
+            <p:cNvPicPr>
+              <a:picLocks noChangeAspect="1"/>
+            </p:cNvPicPr>
+            <p:nvPr/>
+          </p:nvPicPr>
+          <p:blipFill>
+            <a:blip r:embed="rId5">
+              <a:extLst>
+                <a:ext uri="{28A0092B-C50C-407E-A947-70E740481C1C}">
+                  <a14:useLocalDpi xmlns:a14="http://schemas.microsoft.com/office/drawing/2010/main" val="0"/>
+                </a:ext>
+              </a:extLst>
+            </a:blip>
+            <a:stretch>
+              <a:fillRect/>
+            </a:stretch>
+          </p:blipFill>
+          <p:spPr>
+            <a:xfrm>
+              <a:off x="9126341" y="2551543"/>
+              <a:ext cx="1440000" cy="1080000"/>
+            </a:xfrm>
+            <a:prstGeom prst="rect">
+              <a:avLst/>
+            </a:prstGeom>
+          </p:spPr>
+        </p:pic>
+        <p:cxnSp>
+          <p:nvCxnSpPr>
+            <p:cNvPr id="7" name="직선 화살표 연결선 6"/>
+            <p:cNvCxnSpPr>
+              <a:stCxn id="3" idx="3"/>
+              <a:endCxn id="4" idx="1"/>
+            </p:cNvCxnSpPr>
+            <p:nvPr/>
+          </p:nvCxnSpPr>
+          <p:spPr>
+            <a:xfrm>
+              <a:off x="6806658" y="3091543"/>
+              <a:ext cx="412628" cy="0"/>
+            </a:xfrm>
+            <a:prstGeom prst="straightConnector1">
+              <a:avLst/>
+            </a:prstGeom>
+            <a:ln w="19050">
+              <a:solidFill>
+                <a:schemeClr val="tx1"/>
+              </a:solidFill>
+              <a:tailEnd type="triangle"/>
+            </a:ln>
+          </p:spPr>
+          <p:style>
+            <a:lnRef idx="1">
+              <a:schemeClr val="accent1"/>
+            </a:lnRef>
+            <a:fillRef idx="0">
+              <a:schemeClr val="accent1"/>
+            </a:fillRef>
+            <a:effectRef idx="0">
+              <a:schemeClr val="accent1"/>
+            </a:effectRef>
+            <a:fontRef idx="minor">
+              <a:schemeClr val="tx1"/>
+            </a:fontRef>
+          </p:style>
+        </p:cxnSp>
+        <p:cxnSp>
+          <p:nvCxnSpPr>
+            <p:cNvPr id="13" name="꺾인 연결선 12"/>
+            <p:cNvCxnSpPr>
+              <a:stCxn id="10" idx="3"/>
+              <a:endCxn id="4" idx="0"/>
+            </p:cNvCxnSpPr>
+            <p:nvPr/>
+          </p:nvCxnSpPr>
+          <p:spPr>
+            <a:xfrm>
+              <a:off x="5192482" y="2342774"/>
+              <a:ext cx="2746804" cy="208769"/>
+            </a:xfrm>
+            <a:prstGeom prst="bentConnector2">
+              <a:avLst/>
+            </a:prstGeom>
+            <a:ln w="19050">
+              <a:solidFill>
+                <a:schemeClr val="tx1"/>
+              </a:solidFill>
+              <a:tailEnd type="triangle"/>
+            </a:ln>
+          </p:spPr>
+          <p:style>
+            <a:lnRef idx="1">
+              <a:schemeClr val="accent1"/>
+            </a:lnRef>
+            <a:fillRef idx="0">
+              <a:schemeClr val="accent1"/>
+            </a:fillRef>
+            <a:effectRef idx="0">
+              <a:schemeClr val="accent1"/>
+            </a:effectRef>
+            <a:fontRef idx="minor">
+              <a:schemeClr val="tx1"/>
+            </a:fontRef>
+          </p:style>
+        </p:cxnSp>
+        <p:cxnSp>
+          <p:nvCxnSpPr>
+            <p:cNvPr id="18" name="꺾인 연결선 17"/>
+            <p:cNvCxnSpPr>
+              <a:stCxn id="16" idx="3"/>
+              <a:endCxn id="4" idx="2"/>
+            </p:cNvCxnSpPr>
+            <p:nvPr/>
+          </p:nvCxnSpPr>
+          <p:spPr>
+            <a:xfrm flipV="1">
+              <a:off x="5192482" y="3631543"/>
+              <a:ext cx="2746804" cy="191689"/>
+            </a:xfrm>
+            <a:prstGeom prst="bentConnector2">
+              <a:avLst/>
+            </a:prstGeom>
+            <a:ln w="19050">
+              <a:solidFill>
+                <a:schemeClr val="tx1"/>
+              </a:solidFill>
+              <a:tailEnd type="triangle"/>
+            </a:ln>
+          </p:spPr>
+          <p:style>
+            <a:lnRef idx="1">
+              <a:schemeClr val="accent1"/>
+            </a:lnRef>
+            <a:fillRef idx="0">
+              <a:schemeClr val="accent1"/>
+            </a:fillRef>
+            <a:effectRef idx="0">
+              <a:schemeClr val="accent1"/>
+            </a:effectRef>
+            <a:fontRef idx="minor">
+              <a:schemeClr val="tx1"/>
+            </a:fontRef>
+          </p:style>
+        </p:cxnSp>
+        <p:sp>
+          <p:nvSpPr>
+            <p:cNvPr id="20" name="타원 19"/>
+            <p:cNvSpPr/>
+            <p:nvPr/>
+          </p:nvSpPr>
+          <p:spPr>
+            <a:xfrm>
+              <a:off x="8735484" y="2938109"/>
+              <a:ext cx="306867" cy="306867"/>
+            </a:xfrm>
+            <a:prstGeom prst="ellipse">
+              <a:avLst/>
+            </a:prstGeom>
+            <a:ln w="19050"/>
+          </p:spPr>
+          <p:style>
+            <a:lnRef idx="2">
+              <a:schemeClr val="dk1"/>
+            </a:lnRef>
+            <a:fillRef idx="1">
+              <a:schemeClr val="lt1"/>
+            </a:fillRef>
+            <a:effectRef idx="0">
+              <a:schemeClr val="dk1"/>
+            </a:effectRef>
+            <a:fontRef idx="minor">
+              <a:schemeClr val="dk1"/>
+            </a:fontRef>
+          </p:style>
+          <p:txBody>
+            <a:bodyPr rtlCol="0" anchor="ctr"/>
+            <a:lstStyle/>
+            <a:p>
+              <a:pPr algn="ctr"/>
+              <a:r>
+                <a:rPr lang="ko-KR" altLang="en-US" b="1" dirty="0" smtClean="0"/>
+                <a:t>─</a:t>
+              </a:r>
+              <a:endParaRPr lang="ko-KR" altLang="en-US" b="1" dirty="0"/>
+            </a:p>
+          </p:txBody>
+        </p:sp>
+        <p:cxnSp>
+          <p:nvCxnSpPr>
+            <p:cNvPr id="25" name="꺾인 연결선 24"/>
+            <p:cNvCxnSpPr>
+              <a:stCxn id="20" idx="0"/>
+              <a:endCxn id="32" idx="0"/>
+            </p:cNvCxnSpPr>
+            <p:nvPr/>
+          </p:nvCxnSpPr>
+          <p:spPr>
+            <a:xfrm rot="16200000" flipV="1">
+              <a:off x="5637832" y="-312977"/>
+              <a:ext cx="1117612" cy="5384560"/>
+            </a:xfrm>
+            <a:prstGeom prst="bentConnector3">
+              <a:avLst>
+                <a:gd name="adj1" fmla="val 120454"/>
+              </a:avLst>
+            </a:prstGeom>
+            <a:ln w="19050">
+              <a:solidFill>
+                <a:srgbClr val="FF0000"/>
+              </a:solidFill>
+              <a:tailEnd type="triangle"/>
+            </a:ln>
+          </p:spPr>
+          <p:style>
+            <a:lnRef idx="1">
+              <a:schemeClr val="accent1"/>
+            </a:lnRef>
+            <a:fillRef idx="0">
+              <a:schemeClr val="accent1"/>
+            </a:fillRef>
+            <a:effectRef idx="0">
+              <a:schemeClr val="accent1"/>
+            </a:effectRef>
+            <a:fontRef idx="minor">
+              <a:schemeClr val="tx1"/>
+            </a:fontRef>
+          </p:style>
+        </p:cxnSp>
+        <p:cxnSp>
+          <p:nvCxnSpPr>
+            <p:cNvPr id="30" name="꺾인 연결선 29"/>
+            <p:cNvCxnSpPr>
+              <a:stCxn id="20" idx="4"/>
+              <a:endCxn id="37" idx="2"/>
+            </p:cNvCxnSpPr>
+            <p:nvPr/>
+          </p:nvCxnSpPr>
+          <p:spPr>
+            <a:xfrm rot="5400000">
+              <a:off x="5497267" y="1170283"/>
+              <a:ext cx="1316959" cy="5466345"/>
+            </a:xfrm>
+            <a:prstGeom prst="bentConnector3">
+              <a:avLst>
+                <a:gd name="adj1" fmla="val 117358"/>
+              </a:avLst>
+            </a:prstGeom>
+            <a:ln w="19050">
+              <a:solidFill>
+                <a:srgbClr val="FF0000"/>
+              </a:solidFill>
+              <a:tailEnd type="triangle"/>
+            </a:ln>
+          </p:spPr>
+          <p:style>
+            <a:lnRef idx="1">
+              <a:schemeClr val="accent1"/>
+            </a:lnRef>
+            <a:fillRef idx="0">
+              <a:schemeClr val="accent1"/>
+            </a:fillRef>
+            <a:effectRef idx="0">
+              <a:schemeClr val="accent1"/>
+            </a:effectRef>
+            <a:fontRef idx="minor">
+              <a:schemeClr val="tx1"/>
+            </a:fontRef>
+          </p:style>
+        </p:cxnSp>
+        <p:sp>
+          <p:nvSpPr>
+            <p:cNvPr id="31" name="TextBox 30"/>
+            <p:cNvSpPr txBox="1"/>
+            <p:nvPr/>
+          </p:nvSpPr>
+          <p:spPr>
+            <a:xfrm>
+              <a:off x="1845194" y="1820497"/>
+              <a:ext cx="1032335" cy="215444"/>
+            </a:xfrm>
+            <a:prstGeom prst="rect">
+              <a:avLst/>
+            </a:prstGeom>
+            <a:solidFill>
+              <a:schemeClr val="bg1"/>
+            </a:solidFill>
+          </p:spPr>
+          <p:txBody>
+            <a:bodyPr wrap="none" lIns="0" tIns="0" rIns="0" bIns="0" rtlCol="0">
+              <a:spAutoFit/>
+            </a:bodyPr>
+            <a:lstStyle/>
+            <a:p>
+              <a:pPr algn="ctr"/>
+              <a:r>
+                <a:rPr lang="en-US" altLang="ko-KR" sz="1400" dirty="0" smtClean="0"/>
+                <a:t>input frames</a:t>
+              </a:r>
+              <a:endParaRPr lang="ko-KR" altLang="en-US" sz="1400" dirty="0"/>
+            </a:p>
+          </p:txBody>
+        </p:sp>
+        <p:sp>
+          <p:nvSpPr>
+            <p:cNvPr id="32" name="TextBox 31"/>
+            <p:cNvSpPr txBox="1"/>
+            <p:nvPr/>
+          </p:nvSpPr>
+          <p:spPr>
+            <a:xfrm>
+              <a:off x="3106813" y="1820497"/>
+              <a:ext cx="795090" cy="215444"/>
+            </a:xfrm>
+            <a:prstGeom prst="rect">
+              <a:avLst/>
+            </a:prstGeom>
+            <a:solidFill>
+              <a:schemeClr val="bg1"/>
+            </a:solidFill>
+          </p:spPr>
+          <p:txBody>
+            <a:bodyPr wrap="none" lIns="0" tIns="0" rIns="0" bIns="0" rtlCol="0">
+              <a:spAutoFit/>
+            </a:bodyPr>
+            <a:lstStyle/>
+            <a:p>
+              <a:pPr algn="ctr"/>
+              <a:r>
+                <a:rPr lang="en-US" altLang="ko-KR" sz="1400" dirty="0" err="1" smtClean="0"/>
+                <a:t>DepthNet</a:t>
+              </a:r>
+              <a:endParaRPr lang="ko-KR" altLang="en-US" sz="1400" dirty="0"/>
+            </a:p>
+          </p:txBody>
+        </p:sp>
+        <p:sp>
+          <p:nvSpPr>
+            <p:cNvPr id="33" name="TextBox 32"/>
+            <p:cNvSpPr txBox="1"/>
+            <p:nvPr/>
+          </p:nvSpPr>
+          <p:spPr>
+            <a:xfrm>
+              <a:off x="4114503" y="1820497"/>
+              <a:ext cx="1361591" cy="215444"/>
+            </a:xfrm>
+            <a:prstGeom prst="rect">
+              <a:avLst/>
+            </a:prstGeom>
+            <a:solidFill>
+              <a:schemeClr val="bg1"/>
+            </a:solidFill>
+          </p:spPr>
+          <p:txBody>
+            <a:bodyPr wrap="none" lIns="0" tIns="0" rIns="0" bIns="0" rtlCol="0">
+              <a:spAutoFit/>
+            </a:bodyPr>
+            <a:lstStyle/>
+            <a:p>
+              <a:pPr algn="ctr"/>
+              <a:r>
+                <a:rPr lang="en-US" altLang="ko-KR" sz="1400" dirty="0"/>
+                <a:t>d</a:t>
+              </a:r>
+              <a:r>
+                <a:rPr lang="en-US" altLang="ko-KR" sz="1400" dirty="0" smtClean="0"/>
+                <a:t>epth prediction</a:t>
+              </a:r>
+              <a:endParaRPr lang="ko-KR" altLang="en-US" sz="1400" dirty="0"/>
+            </a:p>
+          </p:txBody>
+        </p:sp>
+        <p:sp>
+          <p:nvSpPr>
+            <p:cNvPr id="37" name="TextBox 36"/>
+            <p:cNvSpPr txBox="1"/>
+            <p:nvPr/>
+          </p:nvSpPr>
+          <p:spPr>
+            <a:xfrm>
+              <a:off x="3085525" y="4346491"/>
+              <a:ext cx="674095" cy="215444"/>
+            </a:xfrm>
+            <a:prstGeom prst="rect">
+              <a:avLst/>
+            </a:prstGeom>
+            <a:solidFill>
+              <a:schemeClr val="bg1"/>
+            </a:solidFill>
+          </p:spPr>
+          <p:txBody>
+            <a:bodyPr wrap="none" lIns="0" tIns="0" rIns="0" bIns="0" rtlCol="0">
+              <a:spAutoFit/>
+            </a:bodyPr>
+            <a:lstStyle/>
+            <a:p>
+              <a:pPr algn="ctr"/>
+              <a:r>
+                <a:rPr lang="en-US" altLang="ko-KR" sz="1400" dirty="0" err="1" smtClean="0"/>
+                <a:t>PoseNet</a:t>
+              </a:r>
+              <a:endParaRPr lang="ko-KR" altLang="en-US" sz="1400" dirty="0"/>
+            </a:p>
+          </p:txBody>
+        </p:sp>
+        <p:sp>
+          <p:nvSpPr>
+            <p:cNvPr id="38" name="TextBox 37"/>
+            <p:cNvSpPr txBox="1"/>
+            <p:nvPr/>
+          </p:nvSpPr>
+          <p:spPr>
+            <a:xfrm>
+              <a:off x="4076800" y="4346491"/>
+              <a:ext cx="1273427" cy="215444"/>
+            </a:xfrm>
+            <a:prstGeom prst="rect">
+              <a:avLst/>
+            </a:prstGeom>
+            <a:solidFill>
+              <a:schemeClr val="bg1"/>
+            </a:solidFill>
+          </p:spPr>
+          <p:txBody>
+            <a:bodyPr wrap="none" lIns="0" tIns="0" rIns="0" bIns="0" rtlCol="0">
+              <a:spAutoFit/>
+            </a:bodyPr>
+            <a:lstStyle/>
+            <a:p>
+              <a:pPr algn="ctr"/>
+              <a:r>
+                <a:rPr lang="en-US" altLang="ko-KR" sz="1400" dirty="0" smtClean="0"/>
+                <a:t>pose prediction</a:t>
+              </a:r>
+              <a:endParaRPr lang="ko-KR" altLang="en-US" sz="1400" dirty="0"/>
+            </a:p>
+          </p:txBody>
+        </p:sp>
+        <p:sp>
+          <p:nvSpPr>
+            <p:cNvPr id="41" name="TextBox 40"/>
+            <p:cNvSpPr txBox="1"/>
+            <p:nvPr/>
+          </p:nvSpPr>
+          <p:spPr>
+            <a:xfrm>
+              <a:off x="5624272" y="3880242"/>
+              <a:ext cx="1063433" cy="215444"/>
+            </a:xfrm>
+            <a:prstGeom prst="rect">
+              <a:avLst/>
+            </a:prstGeom>
+            <a:solidFill>
+              <a:schemeClr val="bg1"/>
+            </a:solidFill>
+          </p:spPr>
+          <p:txBody>
+            <a:bodyPr wrap="none" lIns="0" tIns="0" rIns="0" bIns="0" rtlCol="0">
+              <a:spAutoFit/>
+            </a:bodyPr>
+            <a:lstStyle/>
+            <a:p>
+              <a:pPr algn="ctr"/>
+              <a:r>
+                <a:rPr lang="en-US" altLang="ko-KR" sz="1400" dirty="0" smtClean="0"/>
+                <a:t>source frame</a:t>
+              </a:r>
+              <a:endParaRPr lang="ko-KR" altLang="en-US" sz="1400" dirty="0"/>
+            </a:p>
+          </p:txBody>
+        </p:sp>
+        <p:sp>
+          <p:nvSpPr>
+            <p:cNvPr id="42" name="TextBox 41"/>
+            <p:cNvSpPr txBox="1"/>
+            <p:nvPr/>
+          </p:nvSpPr>
+          <p:spPr>
+            <a:xfrm>
+              <a:off x="7382659" y="3814926"/>
+              <a:ext cx="1113253" cy="430887"/>
+            </a:xfrm>
+            <a:prstGeom prst="rect">
+              <a:avLst/>
+            </a:prstGeom>
+            <a:noFill/>
+          </p:spPr>
+          <p:txBody>
+            <a:bodyPr wrap="none" lIns="0" tIns="0" rIns="0" bIns="0" rtlCol="0">
+              <a:spAutoFit/>
+            </a:bodyPr>
+            <a:lstStyle/>
+            <a:p>
+              <a:pPr algn="ctr"/>
+              <a:r>
+                <a:rPr lang="en-US" altLang="ko-KR" sz="1400" dirty="0"/>
+                <a:t>r</a:t>
+              </a:r>
+              <a:r>
+                <a:rPr lang="en-US" altLang="ko-KR" sz="1400" dirty="0" smtClean="0"/>
+                <a:t>econstructed</a:t>
+              </a:r>
+            </a:p>
+            <a:p>
+              <a:pPr algn="ctr"/>
+              <a:r>
+                <a:rPr lang="en-US" altLang="ko-KR" sz="1400" dirty="0" smtClean="0"/>
+                <a:t>target frame</a:t>
+              </a:r>
+              <a:endParaRPr lang="ko-KR" altLang="en-US" sz="1400" dirty="0"/>
+            </a:p>
+          </p:txBody>
+        </p:sp>
+        <p:sp>
+          <p:nvSpPr>
+            <p:cNvPr id="43" name="TextBox 42"/>
+            <p:cNvSpPr txBox="1"/>
+            <p:nvPr/>
+          </p:nvSpPr>
+          <p:spPr>
+            <a:xfrm>
+              <a:off x="9144707" y="3695184"/>
+              <a:ext cx="1403269" cy="215444"/>
+            </a:xfrm>
+            <a:prstGeom prst="rect">
+              <a:avLst/>
+            </a:prstGeom>
+            <a:solidFill>
+              <a:schemeClr val="bg1"/>
+            </a:solidFill>
+          </p:spPr>
+          <p:txBody>
+            <a:bodyPr wrap="none" lIns="0" tIns="0" rIns="0" bIns="0" rtlCol="0">
+              <a:spAutoFit/>
+            </a:bodyPr>
+            <a:lstStyle/>
+            <a:p>
+              <a:pPr algn="ctr"/>
+              <a:r>
+                <a:rPr lang="en-US" altLang="ko-KR" sz="1400" dirty="0" smtClean="0"/>
+                <a:t>true target frame</a:t>
+              </a:r>
+              <a:endParaRPr lang="ko-KR" altLang="en-US" sz="1400" dirty="0"/>
+            </a:p>
+          </p:txBody>
+        </p:sp>
+        <p:sp>
+          <p:nvSpPr>
+            <p:cNvPr id="44" name="TextBox 43"/>
+            <p:cNvSpPr txBox="1"/>
+            <p:nvPr/>
+          </p:nvSpPr>
+          <p:spPr>
+            <a:xfrm>
+              <a:off x="6156326" y="1604071"/>
+              <a:ext cx="1550553" cy="307777"/>
+            </a:xfrm>
+            <a:prstGeom prst="rect">
+              <a:avLst/>
+            </a:prstGeom>
+            <a:noFill/>
+          </p:spPr>
+          <p:txBody>
+            <a:bodyPr wrap="none" rtlCol="0">
+              <a:spAutoFit/>
+            </a:bodyPr>
+            <a:lstStyle/>
+            <a:p>
+              <a:pPr algn="ctr"/>
+              <a:r>
+                <a:rPr lang="en-US" altLang="ko-KR" sz="1400" dirty="0" smtClean="0">
+                  <a:solidFill>
+                    <a:srgbClr val="FF0000"/>
+                  </a:solidFill>
+                </a:rPr>
+                <a:t>Photometric loss</a:t>
+              </a:r>
+              <a:endParaRPr lang="ko-KR" altLang="en-US" sz="1400" dirty="0">
+                <a:solidFill>
+                  <a:srgbClr val="FF0000"/>
+                </a:solidFill>
+              </a:endParaRPr>
+            </a:p>
+          </p:txBody>
+        </p:sp>
+        <p:sp>
+          <p:nvSpPr>
+            <p:cNvPr id="45" name="TextBox 44"/>
+            <p:cNvSpPr txBox="1"/>
+            <p:nvPr/>
+          </p:nvSpPr>
+          <p:spPr>
+            <a:xfrm>
+              <a:off x="6156326" y="4475267"/>
+              <a:ext cx="1550553" cy="307777"/>
+            </a:xfrm>
+            <a:prstGeom prst="rect">
+              <a:avLst/>
+            </a:prstGeom>
+            <a:noFill/>
+          </p:spPr>
+          <p:txBody>
+            <a:bodyPr wrap="none" rtlCol="0">
+              <a:spAutoFit/>
+            </a:bodyPr>
+            <a:lstStyle/>
+            <a:p>
+              <a:pPr algn="ctr"/>
+              <a:r>
+                <a:rPr lang="en-US" altLang="ko-KR" sz="1400" dirty="0" smtClean="0">
+                  <a:solidFill>
+                    <a:srgbClr val="FF0000"/>
+                  </a:solidFill>
+                </a:rPr>
+                <a:t>Photometric loss</a:t>
+              </a:r>
+              <a:endParaRPr lang="ko-KR" altLang="en-US" sz="1400" dirty="0">
+                <a:solidFill>
+                  <a:srgbClr val="FF0000"/>
+                </a:solidFill>
+              </a:endParaRPr>
+            </a:p>
+          </p:txBody>
+        </p:sp>
+      </p:grpSp>
+    </p:spTree>
+    <p:extLst>
+      <p:ext uri="{BB962C8B-B14F-4D97-AF65-F5344CB8AC3E}">
+        <p14:creationId xmlns:p14="http://schemas.microsoft.com/office/powerpoint/2010/main" val="389638049"/>
+      </p:ext>
+    </p:extLst>
+  </p:cSld>
+  <p:clrMapOvr>
+    <a:masterClrMapping/>
+  </p:clrMapOvr>
+</p:sld>
+</file>
+
 <file path=ppt/theme/theme1.xml><?xml version="1.0" encoding="utf-8"?>
 <a:theme xmlns:a="http://schemas.openxmlformats.org/drawingml/2006/main" name="Office 테마">
   <a:themeElements>
@@ -3902,7 +6789,34 @@
       </a:bgFillStyleLst>
     </a:fmtScheme>
   </a:themeElements>
-  <a:objectDefaults/>
+  <a:objectDefaults>
+    <a:lnDef>
+      <a:spPr>
+        <a:ln w="19050">
+          <a:solidFill>
+            <a:schemeClr val="tx1"/>
+          </a:solidFill>
+          <a:tailEnd type="triangle"/>
+        </a:ln>
+      </a:spPr>
+      <a:bodyPr/>
+      <a:lstStyle/>
+      <a:style>
+        <a:lnRef idx="1">
+          <a:schemeClr val="accent1"/>
+        </a:lnRef>
+        <a:fillRef idx="0">
+          <a:schemeClr val="accent1"/>
+        </a:fillRef>
+        <a:effectRef idx="0">
+          <a:schemeClr val="accent1"/>
+        </a:effectRef>
+        <a:fontRef idx="minor">
+          <a:schemeClr val="tx1"/>
+        </a:fontRef>
+      </a:style>
+    </a:lnDef>
+  </a:objectDefaults>
   <a:extraClrSchemeLst/>
   <a:extLst>
     <a:ext uri="{05A4C25C-085E-4340-85A3-A5531E510DB2}">

</xml_diff>